<commit_message>
[!] Prezrel som prezentaciu
Signed-off-by: xtursky <xtursky@gmail.com>
</commit_message>
<xml_diff>
--- a/Dokumentacie/Ostatne/Prezentacie/LS/TrollEdit.pptx
+++ b/Dokumentacie/Ostatne/Prezentacie/LS/TrollEdit.pptx
@@ -169,7 +169,7 @@
             </a:lvl1pPr>
           </a:lstStyle>
           <a:p>
-            <a:endParaRPr lang="sk-SK"/>
+            <a:endParaRPr lang="sk-SK" dirty="0"/>
           </a:p>
         </p:txBody>
       </p:sp>
@@ -205,7 +205,7 @@
               <a:pPr/>
               <a:t>4. 3. 2012</a:t>
             </a:fld>
-            <a:endParaRPr lang="sk-SK"/>
+            <a:endParaRPr lang="sk-SK" dirty="0"/>
           </a:p>
         </p:txBody>
       </p:sp>
@@ -238,7 +238,7 @@
           <a:bodyPr vert="horz" lIns="91440" tIns="45720" rIns="91440" bIns="45720" rtlCol="0" anchor="ctr"/>
           <a:lstStyle/>
           <a:p>
-            <a:endParaRPr lang="sk-SK"/>
+            <a:endParaRPr lang="sk-SK" dirty="0"/>
           </a:p>
         </p:txBody>
       </p:sp>
@@ -331,7 +331,7 @@
             </a:lvl1pPr>
           </a:lstStyle>
           <a:p>
-            <a:endParaRPr lang="sk-SK"/>
+            <a:endParaRPr lang="sk-SK" dirty="0"/>
           </a:p>
         </p:txBody>
       </p:sp>
@@ -367,7 +367,7 @@
               <a:pPr/>
               <a:t>‹#›</a:t>
             </a:fld>
-            <a:endParaRPr lang="sk-SK"/>
+            <a:endParaRPr lang="sk-SK" dirty="0"/>
           </a:p>
         </p:txBody>
       </p:sp>
@@ -544,7 +544,7 @@
               <a:pPr/>
               <a:t>1</a:t>
             </a:fld>
-            <a:endParaRPr lang="sk-SK"/>
+            <a:endParaRPr lang="sk-SK" dirty="0"/>
           </a:p>
         </p:txBody>
       </p:sp>
@@ -933,29 +933,6 @@
               <a:t>D</a:t>
             </a:r>
             <a:r>
-              <a:rPr kumimoji="0" lang="sk-SK" sz="1200" u="none" strike="noStrike" kern="0" cap="none" normalizeH="0" baseline="0" noProof="0" dirty="0" err="1" smtClean="0">
-                <a:ln w="18415" cmpd="sng">
-                  <a:noFill/>
-                  <a:prstDash val="solid"/>
-                </a:ln>
-                <a:solidFill>
-                  <a:srgbClr val="FFFFFF"/>
-                </a:solidFill>
-                <a:effectLst>
-                  <a:outerShdw blurRad="50800" dist="38100" dir="2700000" algn="tl" rotWithShape="0">
-                    <a:prstClr val="black">
-                      <a:alpha val="40000"/>
-                    </a:prstClr>
-                  </a:outerShdw>
-                </a:effectLst>
-                <a:uLnTx/>
-                <a:uFillTx/>
-                <a:latin typeface="Times New Roman" pitchFamily="18" charset="0"/>
-                <a:cs typeface="Times New Roman" pitchFamily="18" charset="0"/>
-              </a:rPr>
-              <a:t>oplnenie</a:t>
-            </a:r>
-            <a:r>
               <a:rPr kumimoji="0" lang="sk-SK" sz="1200" u="none" strike="noStrike" kern="0" cap="none" normalizeH="0" baseline="0" noProof="0" dirty="0" smtClean="0">
                 <a:ln w="18415" cmpd="sng">
                   <a:noFill/>
@@ -976,7 +953,7 @@
                 <a:latin typeface="Times New Roman" pitchFamily="18" charset="0"/>
                 <a:cs typeface="Times New Roman" pitchFamily="18" charset="0"/>
               </a:rPr>
-              <a:t> editora o ďalšie</a:t>
+              <a:t>oplnenie editora o ďalšie</a:t>
             </a:r>
             <a:r>
               <a:rPr kumimoji="0" lang="sk-SK" sz="1200" u="none" strike="noStrike" kern="0" cap="none" normalizeH="0" noProof="0" dirty="0" smtClean="0">
@@ -1054,7 +1031,7 @@
               <a:t>M</a:t>
             </a:r>
             <a:r>
-              <a:rPr lang="en-US" sz="1200" kern="0" baseline="0" dirty="0" err="1" smtClean="0">
+              <a:rPr lang="en-US" sz="1200" kern="0" baseline="0" dirty="0" smtClean="0">
                 <a:ln w="18415" cmpd="sng">
                   <a:noFill/>
                   <a:prstDash val="solid"/>
@@ -1243,7 +1220,7 @@
               <a:pPr/>
               <a:t>3</a:t>
             </a:fld>
-            <a:endParaRPr lang="sk-SK"/>
+            <a:endParaRPr lang="sk-SK" dirty="0"/>
           </a:p>
         </p:txBody>
       </p:sp>
@@ -1354,29 +1331,16 @@
                 <a:latin typeface="Times New Roman" pitchFamily="18" charset="0"/>
                 <a:cs typeface="Times New Roman" pitchFamily="18" charset="0"/>
               </a:rPr>
-              <a:t> je realizovaný ako multiplatformová </a:t>
-            </a:r>
-            <a:r>
-              <a:rPr lang="sk-SK" sz="2000" kern="0" dirty="0" err="1" smtClean="0">
-                <a:ln w="18415" cmpd="sng">
-                  <a:noFill/>
-                  <a:prstDash val="solid"/>
-                </a:ln>
-                <a:solidFill>
-                  <a:srgbClr val="FFFFFF"/>
-                </a:solidFill>
-                <a:effectLst>
-                  <a:outerShdw blurRad="50800" dist="38100" dir="2700000" algn="tl" rotWithShape="0">
-                    <a:prstClr val="black">
-                      <a:alpha val="40000"/>
-                    </a:prstClr>
-                  </a:outerShdw>
-                </a:effectLst>
-                <a:latin typeface="Times New Roman" pitchFamily="18" charset="0"/>
-                <a:cs typeface="Times New Roman" pitchFamily="18" charset="0"/>
-              </a:rPr>
-              <a:t>desktopová</a:t>
-            </a:r>
+              <a:t> je realizovaný ako multiplatformová desktopová aplikácia </a:t>
+            </a:r>
+          </a:p>
+          <a:p>
+            <a:pPr>
+              <a:lnSpc>
+                <a:spcPct val="150000"/>
+              </a:lnSpc>
+              <a:defRPr/>
+            </a:pPr>
             <a:r>
               <a:rPr lang="sk-SK" sz="2000" kern="0" dirty="0" smtClean="0">
                 <a:ln w="18415" cmpd="sng">
@@ -1396,16 +1360,29 @@
                 <a:latin typeface="Times New Roman" pitchFamily="18" charset="0"/>
                 <a:cs typeface="Times New Roman" pitchFamily="18" charset="0"/>
               </a:rPr>
-              <a:t> aplikácia </a:t>
-            </a:r>
-          </a:p>
-          <a:p>
-            <a:pPr>
-              <a:lnSpc>
-                <a:spcPct val="150000"/>
-              </a:lnSpc>
-              <a:defRPr/>
-            </a:pPr>
+              <a:t>V</a:t>
+            </a:r>
+            <a:r>
+              <a:rPr lang="en-US" sz="2000" kern="0" dirty="0" smtClean="0">
+                <a:ln w="18415" cmpd="sng">
+                  <a:noFill/>
+                  <a:prstDash val="solid"/>
+                </a:ln>
+                <a:solidFill>
+                  <a:srgbClr val="FFFFFF"/>
+                </a:solidFill>
+                <a:effectLst>
+                  <a:outerShdw blurRad="50800" dist="38100" dir="2700000" algn="tl" rotWithShape="0">
+                    <a:prstClr val="black">
+                      <a:alpha val="40000"/>
+                    </a:prstClr>
+                  </a:outerShdw>
+                </a:effectLst>
+                <a:latin typeface="Times New Roman" pitchFamily="18" charset="0"/>
+                <a:cs typeface="Times New Roman" pitchFamily="18" charset="0"/>
+              </a:rPr>
+              <a:t>ychádza</a:t>
+            </a:r>
             <a:r>
               <a:rPr lang="sk-SK" sz="2000" kern="0" dirty="0" smtClean="0">
                 <a:ln w="18415" cmpd="sng">
@@ -1425,48 +1402,6 @@
                 <a:latin typeface="Times New Roman" pitchFamily="18" charset="0"/>
                 <a:cs typeface="Times New Roman" pitchFamily="18" charset="0"/>
               </a:rPr>
-              <a:t>V</a:t>
-            </a:r>
-            <a:r>
-              <a:rPr lang="en-US" sz="2000" kern="0" dirty="0" err="1" smtClean="0">
-                <a:ln w="18415" cmpd="sng">
-                  <a:noFill/>
-                  <a:prstDash val="solid"/>
-                </a:ln>
-                <a:solidFill>
-                  <a:srgbClr val="FFFFFF"/>
-                </a:solidFill>
-                <a:effectLst>
-                  <a:outerShdw blurRad="50800" dist="38100" dir="2700000" algn="tl" rotWithShape="0">
-                    <a:prstClr val="black">
-                      <a:alpha val="40000"/>
-                    </a:prstClr>
-                  </a:outerShdw>
-                </a:effectLst>
-                <a:latin typeface="Times New Roman" pitchFamily="18" charset="0"/>
-                <a:cs typeface="Times New Roman" pitchFamily="18" charset="0"/>
-              </a:rPr>
-              <a:t>ychádza</a:t>
-            </a:r>
-            <a:r>
-              <a:rPr lang="sk-SK" sz="2000" kern="0" dirty="0" err="1" smtClean="0">
-                <a:ln w="18415" cmpd="sng">
-                  <a:noFill/>
-                  <a:prstDash val="solid"/>
-                </a:ln>
-                <a:solidFill>
-                  <a:srgbClr val="FFFFFF"/>
-                </a:solidFill>
-                <a:effectLst>
-                  <a:outerShdw blurRad="50800" dist="38100" dir="2700000" algn="tl" rotWithShape="0">
-                    <a:prstClr val="black">
-                      <a:alpha val="40000"/>
-                    </a:prstClr>
-                  </a:outerShdw>
-                </a:effectLst>
-                <a:latin typeface="Times New Roman" pitchFamily="18" charset="0"/>
-                <a:cs typeface="Times New Roman" pitchFamily="18" charset="0"/>
-              </a:rPr>
               <a:t>me</a:t>
             </a:r>
             <a:r>
@@ -1488,112 +1423,7 @@
                 <a:latin typeface="Times New Roman" pitchFamily="18" charset="0"/>
                 <a:cs typeface="Times New Roman" pitchFamily="18" charset="0"/>
               </a:rPr>
-              <a:t> z </a:t>
-            </a:r>
-            <a:r>
-              <a:rPr lang="en-US" sz="2000" kern="0" dirty="0" err="1" smtClean="0">
-                <a:ln w="18415" cmpd="sng">
-                  <a:noFill/>
-                  <a:prstDash val="solid"/>
-                </a:ln>
-                <a:solidFill>
-                  <a:srgbClr val="FFFFFF"/>
-                </a:solidFill>
-                <a:effectLst>
-                  <a:outerShdw blurRad="50800" dist="38100" dir="2700000" algn="tl" rotWithShape="0">
-                    <a:prstClr val="black">
-                      <a:alpha val="40000"/>
-                    </a:prstClr>
-                  </a:outerShdw>
-                </a:effectLst>
-                <a:latin typeface="Times New Roman" pitchFamily="18" charset="0"/>
-                <a:cs typeface="Times New Roman" pitchFamily="18" charset="0"/>
-              </a:rPr>
-              <a:t>už</a:t>
-            </a:r>
-            <a:r>
-              <a:rPr lang="en-US" sz="2000" kern="0" dirty="0" smtClean="0">
-                <a:ln w="18415" cmpd="sng">
-                  <a:noFill/>
-                  <a:prstDash val="solid"/>
-                </a:ln>
-                <a:solidFill>
-                  <a:srgbClr val="FFFFFF"/>
-                </a:solidFill>
-                <a:effectLst>
-                  <a:outerShdw blurRad="50800" dist="38100" dir="2700000" algn="tl" rotWithShape="0">
-                    <a:prstClr val="black">
-                      <a:alpha val="40000"/>
-                    </a:prstClr>
-                  </a:outerShdw>
-                </a:effectLst>
-                <a:latin typeface="Times New Roman" pitchFamily="18" charset="0"/>
-                <a:cs typeface="Times New Roman" pitchFamily="18" charset="0"/>
-              </a:rPr>
-              <a:t> </a:t>
-            </a:r>
-            <a:r>
-              <a:rPr lang="en-US" sz="2000" kern="0" dirty="0" err="1" smtClean="0">
-                <a:ln w="18415" cmpd="sng">
-                  <a:noFill/>
-                  <a:prstDash val="solid"/>
-                </a:ln>
-                <a:solidFill>
-                  <a:srgbClr val="FFFFFF"/>
-                </a:solidFill>
-                <a:effectLst>
-                  <a:outerShdw blurRad="50800" dist="38100" dir="2700000" algn="tl" rotWithShape="0">
-                    <a:prstClr val="black">
-                      <a:alpha val="40000"/>
-                    </a:prstClr>
-                  </a:outerShdw>
-                </a:effectLst>
-                <a:latin typeface="Times New Roman" pitchFamily="18" charset="0"/>
-                <a:cs typeface="Times New Roman" pitchFamily="18" charset="0"/>
-              </a:rPr>
-              <a:t>použitých</a:t>
-            </a:r>
-            <a:r>
-              <a:rPr lang="en-US" sz="2000" kern="0" dirty="0" smtClean="0">
-                <a:ln w="18415" cmpd="sng">
-                  <a:noFill/>
-                  <a:prstDash val="solid"/>
-                </a:ln>
-                <a:solidFill>
-                  <a:srgbClr val="FFFFFF"/>
-                </a:solidFill>
-                <a:effectLst>
-                  <a:outerShdw blurRad="50800" dist="38100" dir="2700000" algn="tl" rotWithShape="0">
-                    <a:prstClr val="black">
-                      <a:alpha val="40000"/>
-                    </a:prstClr>
-                  </a:outerShdw>
-                </a:effectLst>
-                <a:latin typeface="Times New Roman" pitchFamily="18" charset="0"/>
-                <a:cs typeface="Times New Roman" pitchFamily="18" charset="0"/>
-              </a:rPr>
-              <a:t> </a:t>
-            </a:r>
-            <a:r>
-              <a:rPr lang="en-US" sz="2000" kern="0" dirty="0" err="1" smtClean="0">
-                <a:ln w="18415" cmpd="sng">
-                  <a:noFill/>
-                  <a:prstDash val="solid"/>
-                </a:ln>
-                <a:solidFill>
-                  <a:srgbClr val="FFFFFF"/>
-                </a:solidFill>
-                <a:effectLst>
-                  <a:outerShdw blurRad="50800" dist="38100" dir="2700000" algn="tl" rotWithShape="0">
-                    <a:prstClr val="black">
-                      <a:alpha val="40000"/>
-                    </a:prstClr>
-                  </a:outerShdw>
-                </a:effectLst>
-                <a:latin typeface="Times New Roman" pitchFamily="18" charset="0"/>
-                <a:cs typeface="Times New Roman" pitchFamily="18" charset="0"/>
-              </a:rPr>
-              <a:t>technológi</a:t>
+              <a:t> z už použitých technológi</a:t>
             </a:r>
             <a:r>
               <a:rPr lang="sk-SK" sz="2000" kern="0" dirty="0" smtClean="0">
@@ -1648,29 +1478,21 @@
                 <a:latin typeface="Times New Roman" pitchFamily="18" charset="0"/>
                 <a:cs typeface="Times New Roman" pitchFamily="18" charset="0"/>
               </a:rPr>
-              <a:t> </a:t>
-            </a:r>
-            <a:r>
-              <a:rPr lang="sk-SK" sz="2000" kern="0" dirty="0" err="1" smtClean="0">
-                <a:ln w="18415" cmpd="sng">
-                  <a:noFill/>
-                  <a:prstDash val="solid"/>
-                </a:ln>
-                <a:solidFill>
-                  <a:srgbClr val="FFFFFF"/>
-                </a:solidFill>
-                <a:effectLst>
-                  <a:outerShdw blurRad="50800" dist="38100" dir="2700000" algn="tl" rotWithShape="0">
-                    <a:prstClr val="black">
-                      <a:alpha val="40000"/>
-                    </a:prstClr>
-                  </a:outerShdw>
-                </a:effectLst>
-                <a:latin typeface="Times New Roman" pitchFamily="18" charset="0"/>
-                <a:cs typeface="Times New Roman" pitchFamily="18" charset="0"/>
-              </a:rPr>
-              <a:t>Qt</a:t>
-            </a:r>
+              <a:t> Qt Creator 	vývojové prostredie</a:t>
+            </a:r>
+          </a:p>
+          <a:p>
+            <a:pPr lvl="1">
+              <a:lnSpc>
+                <a:spcPct val="150000"/>
+              </a:lnSpc>
+              <a:buFont typeface="Wingdings" pitchFamily="2" charset="2"/>
+              <a:buChar char="Ø"/>
+              <a:tabLst>
+                <a:tab pos="3681413" algn="l"/>
+              </a:tabLst>
+              <a:defRPr/>
+            </a:pPr>
             <a:r>
               <a:rPr lang="sk-SK" sz="2000" kern="0" dirty="0" smtClean="0">
                 <a:ln w="18415" cmpd="sng">
@@ -1690,167 +1512,7 @@
                 <a:latin typeface="Times New Roman" pitchFamily="18" charset="0"/>
                 <a:cs typeface="Times New Roman" pitchFamily="18" charset="0"/>
               </a:rPr>
-              <a:t> </a:t>
-            </a:r>
-            <a:r>
-              <a:rPr lang="sk-SK" sz="2000" kern="0" dirty="0" err="1" smtClean="0">
-                <a:ln w="18415" cmpd="sng">
-                  <a:noFill/>
-                  <a:prstDash val="solid"/>
-                </a:ln>
-                <a:solidFill>
-                  <a:srgbClr val="FFFFFF"/>
-                </a:solidFill>
-                <a:effectLst>
-                  <a:outerShdw blurRad="50800" dist="38100" dir="2700000" algn="tl" rotWithShape="0">
-                    <a:prstClr val="black">
-                      <a:alpha val="40000"/>
-                    </a:prstClr>
-                  </a:outerShdw>
-                </a:effectLst>
-                <a:latin typeface="Times New Roman" pitchFamily="18" charset="0"/>
-                <a:cs typeface="Times New Roman" pitchFamily="18" charset="0"/>
-              </a:rPr>
-              <a:t>Creator</a:t>
-            </a:r>
-            <a:r>
-              <a:rPr lang="sk-SK" sz="2000" kern="0" dirty="0" smtClean="0">
-                <a:ln w="18415" cmpd="sng">
-                  <a:noFill/>
-                  <a:prstDash val="solid"/>
-                </a:ln>
-                <a:solidFill>
-                  <a:srgbClr val="FFFFFF"/>
-                </a:solidFill>
-                <a:effectLst>
-                  <a:outerShdw blurRad="50800" dist="38100" dir="2700000" algn="tl" rotWithShape="0">
-                    <a:prstClr val="black">
-                      <a:alpha val="40000"/>
-                    </a:prstClr>
-                  </a:outerShdw>
-                </a:effectLst>
-                <a:latin typeface="Times New Roman" pitchFamily="18" charset="0"/>
-                <a:cs typeface="Times New Roman" pitchFamily="18" charset="0"/>
-              </a:rPr>
-              <a:t> 	vývojové prostredie</a:t>
-            </a:r>
-          </a:p>
-          <a:p>
-            <a:pPr lvl="1">
-              <a:lnSpc>
-                <a:spcPct val="150000"/>
-              </a:lnSpc>
-              <a:buFont typeface="Wingdings" pitchFamily="2" charset="2"/>
-              <a:buChar char="Ø"/>
-              <a:tabLst>
-                <a:tab pos="3681413" algn="l"/>
-              </a:tabLst>
-              <a:defRPr/>
-            </a:pPr>
-            <a:r>
-              <a:rPr lang="sk-SK" sz="2000" kern="0" dirty="0" smtClean="0">
-                <a:ln w="18415" cmpd="sng">
-                  <a:noFill/>
-                  <a:prstDash val="solid"/>
-                </a:ln>
-                <a:solidFill>
-                  <a:srgbClr val="FFFFFF"/>
-                </a:solidFill>
-                <a:effectLst>
-                  <a:outerShdw blurRad="50800" dist="38100" dir="2700000" algn="tl" rotWithShape="0">
-                    <a:prstClr val="black">
-                      <a:alpha val="40000"/>
-                    </a:prstClr>
-                  </a:outerShdw>
-                </a:effectLst>
-                <a:latin typeface="Times New Roman" pitchFamily="18" charset="0"/>
-                <a:cs typeface="Times New Roman" pitchFamily="18" charset="0"/>
-              </a:rPr>
-              <a:t> </a:t>
-            </a:r>
-            <a:r>
-              <a:rPr lang="sk-SK" sz="2000" kern="0" dirty="0" err="1" smtClean="0">
-                <a:ln w="18415" cmpd="sng">
-                  <a:noFill/>
-                  <a:prstDash val="solid"/>
-                </a:ln>
-                <a:solidFill>
-                  <a:srgbClr val="FFFFFF"/>
-                </a:solidFill>
-                <a:effectLst>
-                  <a:outerShdw blurRad="50800" dist="38100" dir="2700000" algn="tl" rotWithShape="0">
-                    <a:prstClr val="black">
-                      <a:alpha val="40000"/>
-                    </a:prstClr>
-                  </a:outerShdw>
-                </a:effectLst>
-                <a:latin typeface="Times New Roman" pitchFamily="18" charset="0"/>
-                <a:cs typeface="Times New Roman" pitchFamily="18" charset="0"/>
-              </a:rPr>
-              <a:t>Qt</a:t>
-            </a:r>
-            <a:r>
-              <a:rPr lang="sk-SK" sz="2000" kern="0" dirty="0" smtClean="0">
-                <a:ln w="18415" cmpd="sng">
-                  <a:noFill/>
-                  <a:prstDash val="solid"/>
-                </a:ln>
-                <a:solidFill>
-                  <a:srgbClr val="FFFFFF"/>
-                </a:solidFill>
-                <a:effectLst>
-                  <a:outerShdw blurRad="50800" dist="38100" dir="2700000" algn="tl" rotWithShape="0">
-                    <a:prstClr val="black">
-                      <a:alpha val="40000"/>
-                    </a:prstClr>
-                  </a:outerShdw>
-                </a:effectLst>
-                <a:latin typeface="Times New Roman" pitchFamily="18" charset="0"/>
-                <a:cs typeface="Times New Roman" pitchFamily="18" charset="0"/>
-              </a:rPr>
-              <a:t> </a:t>
-            </a:r>
-            <a:r>
-              <a:rPr lang="sk-SK" sz="2000" kern="0" dirty="0" err="1" smtClean="0">
-                <a:ln w="18415" cmpd="sng">
-                  <a:noFill/>
-                  <a:prstDash val="solid"/>
-                </a:ln>
-                <a:solidFill>
-                  <a:srgbClr val="FFFFFF"/>
-                </a:solidFill>
-                <a:effectLst>
-                  <a:outerShdw blurRad="50800" dist="38100" dir="2700000" algn="tl" rotWithShape="0">
-                    <a:prstClr val="black">
-                      <a:alpha val="40000"/>
-                    </a:prstClr>
-                  </a:outerShdw>
-                </a:effectLst>
-                <a:latin typeface="Times New Roman" pitchFamily="18" charset="0"/>
-                <a:cs typeface="Times New Roman" pitchFamily="18" charset="0"/>
-              </a:rPr>
-              <a:t>framework</a:t>
-            </a:r>
-            <a:r>
-              <a:rPr lang="sk-SK" sz="2000" kern="0" dirty="0" smtClean="0">
-                <a:ln w="18415" cmpd="sng">
-                  <a:noFill/>
-                  <a:prstDash val="solid"/>
-                </a:ln>
-                <a:solidFill>
-                  <a:srgbClr val="FFFFFF"/>
-                </a:solidFill>
-                <a:effectLst>
-                  <a:outerShdw blurRad="50800" dist="38100" dir="2700000" algn="tl" rotWithShape="0">
-                    <a:prstClr val="black">
-                      <a:alpha val="40000"/>
-                    </a:prstClr>
-                  </a:outerShdw>
-                </a:effectLst>
-                <a:latin typeface="Times New Roman" pitchFamily="18" charset="0"/>
-                <a:cs typeface="Times New Roman" pitchFamily="18" charset="0"/>
-              </a:rPr>
-              <a:t> 	</a:t>
+              <a:t> Qt framework 	</a:t>
             </a:r>
             <a:r>
               <a:rPr lang="pt-BR" sz="2000" kern="0" dirty="0" smtClean="0">
@@ -1975,133 +1637,7 @@
                 <a:latin typeface="Times New Roman" pitchFamily="18" charset="0"/>
                 <a:cs typeface="Times New Roman" pitchFamily="18" charset="0"/>
               </a:rPr>
-              <a:t> </a:t>
-            </a:r>
-            <a:r>
-              <a:rPr lang="sk-SK" sz="2000" kern="0" dirty="0" err="1" smtClean="0">
-                <a:ln w="18415" cmpd="sng">
-                  <a:noFill/>
-                  <a:prstDash val="solid"/>
-                </a:ln>
-                <a:solidFill>
-                  <a:srgbClr val="FFFFFF"/>
-                </a:solidFill>
-                <a:effectLst>
-                  <a:outerShdw blurRad="50800" dist="38100" dir="2700000" algn="tl" rotWithShape="0">
-                    <a:prstClr val="black">
-                      <a:alpha val="40000"/>
-                    </a:prstClr>
-                  </a:outerShdw>
-                </a:effectLst>
-                <a:latin typeface="Times New Roman" pitchFamily="18" charset="0"/>
-                <a:cs typeface="Times New Roman" pitchFamily="18" charset="0"/>
-              </a:rPr>
-              <a:t>Lua</a:t>
-            </a:r>
-            <a:r>
-              <a:rPr lang="sk-SK" sz="2000" kern="0" dirty="0" smtClean="0">
-                <a:ln w="18415" cmpd="sng">
-                  <a:noFill/>
-                  <a:prstDash val="solid"/>
-                </a:ln>
-                <a:solidFill>
-                  <a:srgbClr val="FFFFFF"/>
-                </a:solidFill>
-                <a:effectLst>
-                  <a:outerShdw blurRad="50800" dist="38100" dir="2700000" algn="tl" rotWithShape="0">
-                    <a:prstClr val="black">
-                      <a:alpha val="40000"/>
-                    </a:prstClr>
-                  </a:outerShdw>
-                </a:effectLst>
-                <a:latin typeface="Times New Roman" pitchFamily="18" charset="0"/>
-                <a:cs typeface="Times New Roman" pitchFamily="18" charset="0"/>
-              </a:rPr>
-              <a:t> (</a:t>
-            </a:r>
-            <a:r>
-              <a:rPr lang="sk-SK" sz="2000" kern="0" dirty="0" err="1" smtClean="0">
-                <a:ln w="18415" cmpd="sng">
-                  <a:noFill/>
-                  <a:prstDash val="solid"/>
-                </a:ln>
-                <a:solidFill>
-                  <a:srgbClr val="FFFFFF"/>
-                </a:solidFill>
-                <a:effectLst>
-                  <a:outerShdw blurRad="50800" dist="38100" dir="2700000" algn="tl" rotWithShape="0">
-                    <a:prstClr val="black">
-                      <a:alpha val="40000"/>
-                    </a:prstClr>
-                  </a:outerShdw>
-                </a:effectLst>
-                <a:latin typeface="Times New Roman" pitchFamily="18" charset="0"/>
-                <a:cs typeface="Times New Roman" pitchFamily="18" charset="0"/>
-              </a:rPr>
-              <a:t>LuaJit</a:t>
-            </a:r>
-            <a:r>
-              <a:rPr lang="sk-SK" sz="2000" kern="0" dirty="0" smtClean="0">
-                <a:ln w="18415" cmpd="sng">
-                  <a:noFill/>
-                  <a:prstDash val="solid"/>
-                </a:ln>
-                <a:solidFill>
-                  <a:srgbClr val="FFFFFF"/>
-                </a:solidFill>
-                <a:effectLst>
-                  <a:outerShdw blurRad="50800" dist="38100" dir="2700000" algn="tl" rotWithShape="0">
-                    <a:prstClr val="black">
-                      <a:alpha val="40000"/>
-                    </a:prstClr>
-                  </a:outerShdw>
-                </a:effectLst>
-                <a:latin typeface="Times New Roman" pitchFamily="18" charset="0"/>
-                <a:cs typeface="Times New Roman" pitchFamily="18" charset="0"/>
-              </a:rPr>
-              <a:t>) 	realizuje veľkú časť </a:t>
-            </a:r>
-            <a:r>
-              <a:rPr lang="sk-SK" sz="2000" kern="0" dirty="0" err="1" smtClean="0">
-                <a:ln w="18415" cmpd="sng">
-                  <a:noFill/>
-                  <a:prstDash val="solid"/>
-                </a:ln>
-                <a:solidFill>
-                  <a:srgbClr val="FFFFFF"/>
-                </a:solidFill>
-                <a:effectLst>
-                  <a:outerShdw blurRad="50800" dist="38100" dir="2700000" algn="tl" rotWithShape="0">
-                    <a:prstClr val="black">
-                      <a:alpha val="40000"/>
-                    </a:prstClr>
-                  </a:outerShdw>
-                </a:effectLst>
-                <a:latin typeface="Times New Roman" pitchFamily="18" charset="0"/>
-                <a:cs typeface="Times New Roman" pitchFamily="18" charset="0"/>
-              </a:rPr>
-              <a:t>vypočtou</a:t>
-            </a:r>
-            <a:r>
-              <a:rPr lang="sk-SK" sz="2000" kern="0" dirty="0" smtClean="0">
-                <a:ln w="18415" cmpd="sng">
-                  <a:noFill/>
-                  <a:prstDash val="solid"/>
-                </a:ln>
-                <a:solidFill>
-                  <a:srgbClr val="FFFFFF"/>
-                </a:solidFill>
-                <a:effectLst>
-                  <a:outerShdw blurRad="50800" dist="38100" dir="2700000" algn="tl" rotWithShape="0">
-                    <a:prstClr val="black">
-                      <a:alpha val="40000"/>
-                    </a:prstClr>
-                  </a:outerShdw>
-                </a:effectLst>
-                <a:latin typeface="Times New Roman" pitchFamily="18" charset="0"/>
-                <a:cs typeface="Times New Roman" pitchFamily="18" charset="0"/>
-              </a:rPr>
-              <a:t> </a:t>
+              <a:t> Lua (LuaJit) 	realizuje veľkú časť vypočtou </a:t>
             </a:r>
           </a:p>
           <a:p>
@@ -2137,53 +1673,7 @@
                 <a:latin typeface="Times New Roman" pitchFamily="18" charset="0"/>
                 <a:cs typeface="Times New Roman" pitchFamily="18" charset="0"/>
               </a:rPr>
-              <a:t>Knižnica </a:t>
-            </a:r>
-            <a:r>
-              <a:rPr kumimoji="0" lang="sk-SK" sz="2000" u="none" strike="noStrike" kern="0" cap="none" normalizeH="0" baseline="0" noProof="0" dirty="0" err="1" smtClean="0">
-                <a:ln w="18415" cmpd="sng">
-                  <a:noFill/>
-                  <a:prstDash val="solid"/>
-                </a:ln>
-                <a:solidFill>
-                  <a:srgbClr val="FFFFFF"/>
-                </a:solidFill>
-                <a:effectLst>
-                  <a:outerShdw blurRad="50800" dist="38100" dir="2700000" algn="tl" rotWithShape="0">
-                    <a:prstClr val="black">
-                      <a:alpha val="40000"/>
-                    </a:prstClr>
-                  </a:outerShdw>
-                </a:effectLst>
-                <a:uLnTx/>
-                <a:uFillTx/>
-                <a:latin typeface="Times New Roman" pitchFamily="18" charset="0"/>
-                <a:cs typeface="Times New Roman" pitchFamily="18" charset="0"/>
-              </a:rPr>
-              <a:t>Lpeg</a:t>
-            </a:r>
-            <a:r>
-              <a:rPr kumimoji="0" lang="sk-SK" sz="2000" u="none" strike="noStrike" kern="0" cap="none" normalizeH="0" baseline="0" noProof="0" dirty="0" smtClean="0">
-                <a:ln w="18415" cmpd="sng">
-                  <a:noFill/>
-                  <a:prstDash val="solid"/>
-                </a:ln>
-                <a:solidFill>
-                  <a:srgbClr val="FFFFFF"/>
-                </a:solidFill>
-                <a:effectLst>
-                  <a:outerShdw blurRad="50800" dist="38100" dir="2700000" algn="tl" rotWithShape="0">
-                    <a:prstClr val="black">
-                      <a:alpha val="40000"/>
-                    </a:prstClr>
-                  </a:outerShdw>
-                </a:effectLst>
-                <a:uLnTx/>
-                <a:uFillTx/>
-                <a:latin typeface="Times New Roman" pitchFamily="18" charset="0"/>
-                <a:cs typeface="Times New Roman" pitchFamily="18" charset="0"/>
-              </a:rPr>
-              <a:t> 	syntaktická analýza textu</a:t>
+              <a:t>Knižnica Lpeg 	syntaktická analýza textu</a:t>
             </a:r>
           </a:p>
         </p:txBody>
@@ -2208,7 +1698,7 @@
               <a:pPr/>
               <a:t>4</a:t>
             </a:fld>
-            <a:endParaRPr lang="sk-SK"/>
+            <a:endParaRPr lang="sk-SK" dirty="0"/>
           </a:p>
         </p:txBody>
       </p:sp>
@@ -2296,7 +1786,7 @@
               <a:t>Funkcionalita </a:t>
             </a:r>
             <a:r>
-              <a:rPr lang="sk-SK" sz="1200" i="1" kern="1200" dirty="0" err="1" smtClean="0">
+              <a:rPr lang="sk-SK" sz="1200" i="1" kern="1200" dirty="0" smtClean="0">
                 <a:solidFill>
                   <a:schemeClr val="tx1"/>
                 </a:solidFill>
@@ -2318,7 +1808,7 @@
               <a:t> je postavená na rozdelení editovaného kódu do štruktúr logických blokov, kde logický blok predstavuje akúkoľvek syntakticko-lexikálnu jednotku daného jazyka. Na analýzu kódu využívame skriptovací jazyk </a:t>
             </a:r>
             <a:r>
-              <a:rPr lang="sk-SK" sz="1200" i="1" kern="1200" dirty="0" err="1" smtClean="0">
+              <a:rPr lang="sk-SK" sz="1200" i="1" kern="1200" dirty="0" smtClean="0">
                 <a:solidFill>
                   <a:schemeClr val="tx1"/>
                 </a:solidFill>
@@ -2340,7 +1830,7 @@
               <a:t>, konkrétne knižnicu </a:t>
             </a:r>
             <a:r>
-              <a:rPr lang="sk-SK" sz="1200" i="1" kern="1200" dirty="0" err="1" smtClean="0">
+              <a:rPr lang="sk-SK" sz="1200" i="1" kern="1200" dirty="0" smtClean="0">
                 <a:solidFill>
                   <a:schemeClr val="tx1"/>
                 </a:solidFill>
@@ -2458,18 +1948,7 @@
                 <a:ea typeface="+mn-ea"/>
                 <a:cs typeface="+mn-cs"/>
               </a:rPr>
-              <a:t> </a:t>
-            </a:r>
-            <a:r>
-              <a:rPr lang="sk-SK" sz="1200" i="1" kern="1200" dirty="0" err="1" smtClean="0">
-                <a:solidFill>
-                  <a:schemeClr val="tx1"/>
-                </a:solidFill>
-                <a:latin typeface="+mn-lt"/>
-                <a:ea typeface="+mn-ea"/>
-                <a:cs typeface="+mn-cs"/>
-              </a:rPr>
-              <a:t>Lua</a:t>
+              <a:t> Lua</a:t>
             </a:r>
             <a:r>
               <a:rPr lang="sk-SK" sz="1200" kern="1200" dirty="0" smtClean="0">
@@ -2496,17 +1975,6 @@
               <a:t>Základná funkcionalita aplikácie a práca s blokmi sú implementované. Funkcionality vytvorenia vlastných klávesových skratiek a pokročilej práce s textom </a:t>
             </a:r>
             <a:r>
-              <a:rPr lang="sk-SK" sz="1200" i="1" kern="1200" dirty="0" err="1" smtClean="0">
-                <a:solidFill>
-                  <a:schemeClr val="tx1"/>
-                </a:solidFill>
-                <a:latin typeface="+mn-lt"/>
-                <a:ea typeface="+mn-ea"/>
-                <a:cs typeface="+mn-cs"/>
-              </a:rPr>
-              <a:t>Undo</a:t>
-            </a:r>
-            <a:r>
               <a:rPr lang="sk-SK" sz="1200" i="1" kern="1200" dirty="0" smtClean="0">
                 <a:solidFill>
                   <a:schemeClr val="tx1"/>
@@ -2515,18 +1983,7 @@
                 <a:ea typeface="+mn-ea"/>
                 <a:cs typeface="+mn-cs"/>
               </a:rPr>
-              <a:t>/</a:t>
-            </a:r>
-            <a:r>
-              <a:rPr lang="sk-SK" sz="1200" i="1" kern="1200" dirty="0" err="1" smtClean="0">
-                <a:solidFill>
-                  <a:schemeClr val="tx1"/>
-                </a:solidFill>
-                <a:latin typeface="+mn-lt"/>
-                <a:ea typeface="+mn-ea"/>
-                <a:cs typeface="+mn-cs"/>
-              </a:rPr>
-              <a:t>Redo</a:t>
+              <a:t>Undo/Redo</a:t>
             </a:r>
             <a:r>
               <a:rPr lang="sk-SK" sz="1200" kern="1200" dirty="0" smtClean="0">
@@ -2540,7 +1997,7 @@
               <a:t> sú v ďalšej fáze implementácie. Editor bude podporovať paralelizovanie výpočtovo náročných operácií akou je napr. paralelizované spracovanie syntaktickej analýzy, ktorá už beží v pozadí. Pri práci v </a:t>
             </a:r>
             <a:r>
-              <a:rPr lang="sk-SK" sz="1200" i="1" kern="1200" dirty="0" err="1" smtClean="0">
+              <a:rPr lang="sk-SK" sz="1200" i="1" kern="1200" dirty="0" smtClean="0">
                 <a:solidFill>
                   <a:schemeClr val="tx1"/>
                 </a:solidFill>
@@ -2608,7 +2065,7 @@
               <a:pPr/>
               <a:t>5</a:t>
             </a:fld>
-            <a:endParaRPr lang="sk-SK"/>
+            <a:endParaRPr lang="sk-SK" dirty="0"/>
           </a:p>
         </p:txBody>
       </p:sp>
@@ -2836,10 +2293,20 @@
                 <a:latin typeface="Times New Roman" pitchFamily="18" charset="0"/>
                 <a:cs typeface="Times New Roman" pitchFamily="18" charset="0"/>
               </a:rPr>
-              <a:t> Prenesenie spracovania AST stromu na stranu </a:t>
-            </a:r>
-            <a:r>
-              <a:rPr lang="sk-SK" sz="1200" kern="0" dirty="0" err="1" smtClean="0">
+              <a:t> Prenesenie spracovania AST stromu na stranu Lua</a:t>
+            </a:r>
+          </a:p>
+          <a:p>
+            <a:pPr>
+              <a:lnSpc>
+                <a:spcPct val="200000"/>
+              </a:lnSpc>
+              <a:buFont typeface="Arial" pitchFamily="34" charset="0"/>
+              <a:buChar char="•"/>
+              <a:defRPr/>
+            </a:pPr>
+            <a:r>
+              <a:rPr lang="sk-SK" sz="1200" kern="0" dirty="0" smtClean="0">
                 <a:ln w="18415" cmpd="sng">
                   <a:noFill/>
                   <a:prstDash val="solid"/>
@@ -2857,8 +2324,82 @@
                 <a:latin typeface="Times New Roman" pitchFamily="18" charset="0"/>
                 <a:cs typeface="Times New Roman" pitchFamily="18" charset="0"/>
               </a:rPr>
-              <a:t>Lua</a:t>
-            </a:r>
+              <a:t> Zabudovanie pokročilej práce s textom – Undo, Redo, Copy/Paste</a:t>
+            </a:r>
+          </a:p>
+          <a:p>
+            <a:pPr>
+              <a:lnSpc>
+                <a:spcPct val="200000"/>
+              </a:lnSpc>
+              <a:buFont typeface="Arial" pitchFamily="34" charset="0"/>
+              <a:buChar char="•"/>
+              <a:defRPr/>
+            </a:pPr>
+            <a:r>
+              <a:rPr lang="sk-SK" sz="1200" kern="0" dirty="0" smtClean="0">
+                <a:ln w="18415" cmpd="sng">
+                  <a:noFill/>
+                  <a:prstDash val="solid"/>
+                </a:ln>
+                <a:solidFill>
+                  <a:srgbClr val="FFFFFF"/>
+                </a:solidFill>
+                <a:effectLst>
+                  <a:outerShdw blurRad="50800" dist="38100" dir="2700000" algn="tl" rotWithShape="0">
+                    <a:prstClr val="black">
+                      <a:alpha val="40000"/>
+                    </a:prstClr>
+                  </a:outerShdw>
+                </a:effectLst>
+                <a:latin typeface="Times New Roman" pitchFamily="18" charset="0"/>
+                <a:cs typeface="Times New Roman" pitchFamily="18" charset="0"/>
+              </a:rPr>
+              <a:t> Zabudovanie a vytvorenie vlastných Shortcuts</a:t>
+            </a:r>
+            <a:endParaRPr lang="pl-PL" sz="1200" kern="0" dirty="0" smtClean="0">
+              <a:ln w="18415" cmpd="sng">
+                <a:noFill/>
+                <a:prstDash val="solid"/>
+              </a:ln>
+              <a:solidFill>
+                <a:srgbClr val="FFFFFF"/>
+              </a:solidFill>
+              <a:effectLst>
+                <a:outerShdw blurRad="50800" dist="38100" dir="2700000" algn="tl" rotWithShape="0">
+                  <a:prstClr val="black">
+                    <a:alpha val="40000"/>
+                  </a:prstClr>
+                </a:outerShdw>
+              </a:effectLst>
+              <a:latin typeface="Times New Roman" pitchFamily="18" charset="0"/>
+              <a:cs typeface="Times New Roman" pitchFamily="18" charset="0"/>
+            </a:endParaRPr>
+          </a:p>
+          <a:p>
+            <a:r>
+              <a:rPr lang="sk-SK" sz="1200" kern="0" dirty="0" smtClean="0">
+                <a:ln w="18415" cmpd="sng">
+                  <a:noFill/>
+                  <a:prstDash val="solid"/>
+                </a:ln>
+                <a:solidFill>
+                  <a:srgbClr val="FFFFFF"/>
+                </a:solidFill>
+                <a:effectLst>
+                  <a:outerShdw blurRad="50800" dist="38100" dir="2700000" algn="tl" rotWithShape="0">
+                    <a:prstClr val="black">
+                      <a:alpha val="40000"/>
+                    </a:prstClr>
+                  </a:outerShdw>
+                </a:effectLst>
+                <a:latin typeface="Times New Roman" pitchFamily="18" charset="0"/>
+                <a:cs typeface="Times New Roman" pitchFamily="18" charset="0"/>
+              </a:rPr>
+              <a:t>Práca s editorom založená na dvoch módoch (textový a grafický)</a:t>
+            </a:r>
+          </a:p>
+          <a:p>
             <a:endParaRPr lang="sk-SK" sz="1200" kern="0" dirty="0" smtClean="0">
               <a:ln w="18415" cmpd="sng">
                 <a:noFill/>
@@ -2879,14 +2420,6 @@
             </a:endParaRPr>
           </a:p>
           <a:p>
-            <a:pPr>
-              <a:lnSpc>
-                <a:spcPct val="200000"/>
-              </a:lnSpc>
-              <a:buFont typeface="Arial" pitchFamily="34" charset="0"/>
-              <a:buChar char="•"/>
-              <a:defRPr/>
-            </a:pPr>
             <a:r>
               <a:rPr lang="sk-SK" sz="1200" kern="0" dirty="0" smtClean="0">
                 <a:ln w="18415" cmpd="sng">
@@ -2906,10 +2439,10 @@
                 <a:latin typeface="Times New Roman" pitchFamily="18" charset="0"/>
                 <a:cs typeface="Times New Roman" pitchFamily="18" charset="0"/>
               </a:rPr>
-              <a:t> Zabudovanie pokročilej práce s textom – </a:t>
-            </a:r>
-            <a:r>
-              <a:rPr lang="sk-SK" sz="1200" kern="0" dirty="0" err="1" smtClean="0">
+              <a:t>Povedat niečo</a:t>
+            </a:r>
+            <a:r>
+              <a:rPr lang="sk-SK" sz="1200" kern="0" baseline="0" dirty="0" smtClean="0">
                 <a:ln w="18415" cmpd="sng">
                   <a:noFill/>
                   <a:prstDash val="solid"/>
@@ -2927,10 +2460,16 @@
                 <a:latin typeface="Times New Roman" pitchFamily="18" charset="0"/>
                 <a:cs typeface="Times New Roman" pitchFamily="18" charset="0"/>
               </a:rPr>
-              <a:t>Undo</a:t>
-            </a:r>
-            <a:r>
-              <a:rPr lang="sk-SK" sz="1200" kern="0" dirty="0" smtClean="0">
+              <a:t> o funkcionalite :</a:t>
+            </a:r>
+          </a:p>
+          <a:p>
+            <a:pPr>
+              <a:buFontTx/>
+              <a:buChar char="-"/>
+            </a:pPr>
+            <a:r>
+              <a:rPr lang="sk-SK" sz="1200" kern="0" baseline="0" dirty="0" smtClean="0">
                 <a:ln w="18415" cmpd="sng">
                   <a:noFill/>
                   <a:prstDash val="solid"/>
@@ -2948,10 +2487,16 @@
                 <a:latin typeface="Times New Roman" pitchFamily="18" charset="0"/>
                 <a:cs typeface="Times New Roman" pitchFamily="18" charset="0"/>
               </a:rPr>
-              <a:t>, </a:t>
-            </a:r>
-            <a:r>
-              <a:rPr lang="sk-SK" sz="1200" kern="0" dirty="0" err="1" smtClean="0">
+              <a:t> Shortcuts</a:t>
+            </a:r>
+          </a:p>
+          <a:p>
+            <a:pPr>
+              <a:buFontTx/>
+              <a:buChar char="-"/>
+            </a:pPr>
+            <a:r>
+              <a:rPr lang="sk-SK" sz="1200" kern="0" baseline="0" dirty="0" smtClean="0">
                 <a:ln w="18415" cmpd="sng">
                   <a:noFill/>
                   <a:prstDash val="solid"/>
@@ -2969,10 +2514,16 @@
                 <a:latin typeface="Times New Roman" pitchFamily="18" charset="0"/>
                 <a:cs typeface="Times New Roman" pitchFamily="18" charset="0"/>
               </a:rPr>
-              <a:t>Redo</a:t>
-            </a:r>
-            <a:r>
-              <a:rPr lang="sk-SK" sz="1200" kern="0" dirty="0" smtClean="0">
+              <a:t>  dopytovani do Lua </a:t>
+            </a:r>
+          </a:p>
+          <a:p>
+            <a:pPr>
+              <a:buFontTx/>
+              <a:buChar char="-"/>
+            </a:pPr>
+            <a:r>
+              <a:rPr lang="sk-SK" sz="1200" kern="0" baseline="0" dirty="0" smtClean="0">
                 <a:ln w="18415" cmpd="sng">
                   <a:noFill/>
                   <a:prstDash val="solid"/>
@@ -2990,145 +2541,8 @@
                 <a:latin typeface="Times New Roman" pitchFamily="18" charset="0"/>
                 <a:cs typeface="Times New Roman" pitchFamily="18" charset="0"/>
               </a:rPr>
-              <a:t>, </a:t>
-            </a:r>
-            <a:r>
-              <a:rPr lang="sk-SK" sz="1200" kern="0" dirty="0" err="1" smtClean="0">
-                <a:ln w="18415" cmpd="sng">
-                  <a:noFill/>
-                  <a:prstDash val="solid"/>
-                </a:ln>
-                <a:solidFill>
-                  <a:srgbClr val="FFFFFF"/>
-                </a:solidFill>
-                <a:effectLst>
-                  <a:outerShdw blurRad="50800" dist="38100" dir="2700000" algn="tl" rotWithShape="0">
-                    <a:prstClr val="black">
-                      <a:alpha val="40000"/>
-                    </a:prstClr>
-                  </a:outerShdw>
-                </a:effectLst>
-                <a:latin typeface="Times New Roman" pitchFamily="18" charset="0"/>
-                <a:cs typeface="Times New Roman" pitchFamily="18" charset="0"/>
-              </a:rPr>
-              <a:t>Copy</a:t>
-            </a:r>
-            <a:r>
-              <a:rPr lang="sk-SK" sz="1200" kern="0" dirty="0" smtClean="0">
-                <a:ln w="18415" cmpd="sng">
-                  <a:noFill/>
-                  <a:prstDash val="solid"/>
-                </a:ln>
-                <a:solidFill>
-                  <a:srgbClr val="FFFFFF"/>
-                </a:solidFill>
-                <a:effectLst>
-                  <a:outerShdw blurRad="50800" dist="38100" dir="2700000" algn="tl" rotWithShape="0">
-                    <a:prstClr val="black">
-                      <a:alpha val="40000"/>
-                    </a:prstClr>
-                  </a:outerShdw>
-                </a:effectLst>
-                <a:latin typeface="Times New Roman" pitchFamily="18" charset="0"/>
-                <a:cs typeface="Times New Roman" pitchFamily="18" charset="0"/>
-              </a:rPr>
-              <a:t>/Paste</a:t>
-            </a:r>
-          </a:p>
-          <a:p>
-            <a:pPr>
-              <a:lnSpc>
-                <a:spcPct val="200000"/>
-              </a:lnSpc>
-              <a:buFont typeface="Arial" pitchFamily="34" charset="0"/>
-              <a:buChar char="•"/>
-              <a:defRPr/>
-            </a:pPr>
-            <a:r>
-              <a:rPr lang="sk-SK" sz="1200" kern="0" dirty="0" smtClean="0">
-                <a:ln w="18415" cmpd="sng">
-                  <a:noFill/>
-                  <a:prstDash val="solid"/>
-                </a:ln>
-                <a:solidFill>
-                  <a:srgbClr val="FFFFFF"/>
-                </a:solidFill>
-                <a:effectLst>
-                  <a:outerShdw blurRad="50800" dist="38100" dir="2700000" algn="tl" rotWithShape="0">
-                    <a:prstClr val="black">
-                      <a:alpha val="40000"/>
-                    </a:prstClr>
-                  </a:outerShdw>
-                </a:effectLst>
-                <a:latin typeface="Times New Roman" pitchFamily="18" charset="0"/>
-                <a:cs typeface="Times New Roman" pitchFamily="18" charset="0"/>
-              </a:rPr>
-              <a:t> Zabudovanie a vytvorenie vlastných </a:t>
-            </a:r>
-            <a:r>
-              <a:rPr lang="sk-SK" sz="1200" kern="0" dirty="0" err="1" smtClean="0">
-                <a:ln w="18415" cmpd="sng">
-                  <a:noFill/>
-                  <a:prstDash val="solid"/>
-                </a:ln>
-                <a:solidFill>
-                  <a:srgbClr val="FFFFFF"/>
-                </a:solidFill>
-                <a:effectLst>
-                  <a:outerShdw blurRad="50800" dist="38100" dir="2700000" algn="tl" rotWithShape="0">
-                    <a:prstClr val="black">
-                      <a:alpha val="40000"/>
-                    </a:prstClr>
-                  </a:outerShdw>
-                </a:effectLst>
-                <a:latin typeface="Times New Roman" pitchFamily="18" charset="0"/>
-                <a:cs typeface="Times New Roman" pitchFamily="18" charset="0"/>
-              </a:rPr>
-              <a:t>Shortcuts</a:t>
-            </a:r>
-            <a:endParaRPr lang="pl-PL" sz="1200" kern="0" dirty="0" smtClean="0">
-              <a:ln w="18415" cmpd="sng">
-                <a:noFill/>
-                <a:prstDash val="solid"/>
-              </a:ln>
-              <a:solidFill>
-                <a:srgbClr val="FFFFFF"/>
-              </a:solidFill>
-              <a:effectLst>
-                <a:outerShdw blurRad="50800" dist="38100" dir="2700000" algn="tl" rotWithShape="0">
-                  <a:prstClr val="black">
-                    <a:alpha val="40000"/>
-                  </a:prstClr>
-                </a:outerShdw>
-              </a:effectLst>
-              <a:latin typeface="Times New Roman" pitchFamily="18" charset="0"/>
-              <a:cs typeface="Times New Roman" pitchFamily="18" charset="0"/>
-            </a:endParaRPr>
-          </a:p>
-          <a:p>
-            <a:r>
-              <a:rPr lang="sk-SK" sz="1200" kern="0" dirty="0" smtClean="0">
-                <a:ln w="18415" cmpd="sng">
-                  <a:noFill/>
-                  <a:prstDash val="solid"/>
-                </a:ln>
-                <a:solidFill>
-                  <a:srgbClr val="FFFFFF"/>
-                </a:solidFill>
-                <a:effectLst>
-                  <a:outerShdw blurRad="50800" dist="38100" dir="2700000" algn="tl" rotWithShape="0">
-                    <a:prstClr val="black">
-                      <a:alpha val="40000"/>
-                    </a:prstClr>
-                  </a:outerShdw>
-                </a:effectLst>
-                <a:latin typeface="Times New Roman" pitchFamily="18" charset="0"/>
-                <a:cs typeface="Times New Roman" pitchFamily="18" charset="0"/>
-              </a:rPr>
-              <a:t>Práca s editorom založená na dvoch módoch (textový a grafický)</a:t>
-            </a:r>
-          </a:p>
-          <a:p>
+              <a:t>  dva  mody ukazat </a:t>
+            </a:r>
             <a:endParaRPr lang="sk-SK" sz="1200" kern="0" dirty="0" smtClean="0">
               <a:ln w="18415" cmpd="sng">
                 <a:noFill/>
@@ -3148,377 +2562,6 @@
               <a:cs typeface="Times New Roman" pitchFamily="18" charset="0"/>
             </a:endParaRPr>
           </a:p>
-          <a:p>
-            <a:r>
-              <a:rPr lang="sk-SK" sz="1200" kern="0" dirty="0" err="1" smtClean="0">
-                <a:ln w="18415" cmpd="sng">
-                  <a:noFill/>
-                  <a:prstDash val="solid"/>
-                </a:ln>
-                <a:solidFill>
-                  <a:srgbClr val="FFFFFF"/>
-                </a:solidFill>
-                <a:effectLst>
-                  <a:outerShdw blurRad="50800" dist="38100" dir="2700000" algn="tl" rotWithShape="0">
-                    <a:prstClr val="black">
-                      <a:alpha val="40000"/>
-                    </a:prstClr>
-                  </a:outerShdw>
-                </a:effectLst>
-                <a:latin typeface="Times New Roman" pitchFamily="18" charset="0"/>
-                <a:cs typeface="Times New Roman" pitchFamily="18" charset="0"/>
-              </a:rPr>
-              <a:t>Povedat</a:t>
-            </a:r>
-            <a:r>
-              <a:rPr lang="sk-SK" sz="1200" kern="0" dirty="0" smtClean="0">
-                <a:ln w="18415" cmpd="sng">
-                  <a:noFill/>
-                  <a:prstDash val="solid"/>
-                </a:ln>
-                <a:solidFill>
-                  <a:srgbClr val="FFFFFF"/>
-                </a:solidFill>
-                <a:effectLst>
-                  <a:outerShdw blurRad="50800" dist="38100" dir="2700000" algn="tl" rotWithShape="0">
-                    <a:prstClr val="black">
-                      <a:alpha val="40000"/>
-                    </a:prstClr>
-                  </a:outerShdw>
-                </a:effectLst>
-                <a:latin typeface="Times New Roman" pitchFamily="18" charset="0"/>
-                <a:cs typeface="Times New Roman" pitchFamily="18" charset="0"/>
-              </a:rPr>
-              <a:t> niečo</a:t>
-            </a:r>
-            <a:r>
-              <a:rPr lang="sk-SK" sz="1200" kern="0" baseline="0" dirty="0" smtClean="0">
-                <a:ln w="18415" cmpd="sng">
-                  <a:noFill/>
-                  <a:prstDash val="solid"/>
-                </a:ln>
-                <a:solidFill>
-                  <a:srgbClr val="FFFFFF"/>
-                </a:solidFill>
-                <a:effectLst>
-                  <a:outerShdw blurRad="50800" dist="38100" dir="2700000" algn="tl" rotWithShape="0">
-                    <a:prstClr val="black">
-                      <a:alpha val="40000"/>
-                    </a:prstClr>
-                  </a:outerShdw>
-                </a:effectLst>
-                <a:latin typeface="Times New Roman" pitchFamily="18" charset="0"/>
-                <a:cs typeface="Times New Roman" pitchFamily="18" charset="0"/>
-              </a:rPr>
-              <a:t> o funkcionalite :</a:t>
-            </a:r>
-          </a:p>
-          <a:p>
-            <a:pPr>
-              <a:buFontTx/>
-              <a:buChar char="-"/>
-            </a:pPr>
-            <a:r>
-              <a:rPr lang="sk-SK" sz="1200" kern="0" baseline="0" dirty="0" smtClean="0">
-                <a:ln w="18415" cmpd="sng">
-                  <a:noFill/>
-                  <a:prstDash val="solid"/>
-                </a:ln>
-                <a:solidFill>
-                  <a:srgbClr val="FFFFFF"/>
-                </a:solidFill>
-                <a:effectLst>
-                  <a:outerShdw blurRad="50800" dist="38100" dir="2700000" algn="tl" rotWithShape="0">
-                    <a:prstClr val="black">
-                      <a:alpha val="40000"/>
-                    </a:prstClr>
-                  </a:outerShdw>
-                </a:effectLst>
-                <a:latin typeface="Times New Roman" pitchFamily="18" charset="0"/>
-                <a:cs typeface="Times New Roman" pitchFamily="18" charset="0"/>
-              </a:rPr>
-              <a:t> </a:t>
-            </a:r>
-            <a:r>
-              <a:rPr lang="sk-SK" sz="1200" kern="0" baseline="0" dirty="0" err="1" smtClean="0">
-                <a:ln w="18415" cmpd="sng">
-                  <a:noFill/>
-                  <a:prstDash val="solid"/>
-                </a:ln>
-                <a:solidFill>
-                  <a:srgbClr val="FFFFFF"/>
-                </a:solidFill>
-                <a:effectLst>
-                  <a:outerShdw blurRad="50800" dist="38100" dir="2700000" algn="tl" rotWithShape="0">
-                    <a:prstClr val="black">
-                      <a:alpha val="40000"/>
-                    </a:prstClr>
-                  </a:outerShdw>
-                </a:effectLst>
-                <a:latin typeface="Times New Roman" pitchFamily="18" charset="0"/>
-                <a:cs typeface="Times New Roman" pitchFamily="18" charset="0"/>
-              </a:rPr>
-              <a:t>Shortcuts</a:t>
-            </a:r>
-            <a:endParaRPr lang="sk-SK" sz="1200" kern="0" baseline="0" dirty="0" smtClean="0">
-              <a:ln w="18415" cmpd="sng">
-                <a:noFill/>
-                <a:prstDash val="solid"/>
-              </a:ln>
-              <a:solidFill>
-                <a:srgbClr val="FFFFFF"/>
-              </a:solidFill>
-              <a:effectLst>
-                <a:outerShdw blurRad="50800" dist="38100" dir="2700000" algn="tl" rotWithShape="0">
-                  <a:prstClr val="black">
-                    <a:alpha val="40000"/>
-                  </a:prstClr>
-                </a:outerShdw>
-              </a:effectLst>
-              <a:latin typeface="Times New Roman" pitchFamily="18" charset="0"/>
-              <a:cs typeface="Times New Roman" pitchFamily="18" charset="0"/>
-            </a:endParaRPr>
-          </a:p>
-          <a:p>
-            <a:pPr>
-              <a:buFontTx/>
-              <a:buChar char="-"/>
-            </a:pPr>
-            <a:r>
-              <a:rPr lang="sk-SK" sz="1200" kern="0" baseline="0" dirty="0" smtClean="0">
-                <a:ln w="18415" cmpd="sng">
-                  <a:noFill/>
-                  <a:prstDash val="solid"/>
-                </a:ln>
-                <a:solidFill>
-                  <a:srgbClr val="FFFFFF"/>
-                </a:solidFill>
-                <a:effectLst>
-                  <a:outerShdw blurRad="50800" dist="38100" dir="2700000" algn="tl" rotWithShape="0">
-                    <a:prstClr val="black">
-                      <a:alpha val="40000"/>
-                    </a:prstClr>
-                  </a:outerShdw>
-                </a:effectLst>
-                <a:latin typeface="Times New Roman" pitchFamily="18" charset="0"/>
-                <a:cs typeface="Times New Roman" pitchFamily="18" charset="0"/>
-              </a:rPr>
-              <a:t>  </a:t>
-            </a:r>
-            <a:r>
-              <a:rPr lang="sk-SK" sz="1200" kern="0" baseline="0" dirty="0" err="1" smtClean="0">
-                <a:ln w="18415" cmpd="sng">
-                  <a:noFill/>
-                  <a:prstDash val="solid"/>
-                </a:ln>
-                <a:solidFill>
-                  <a:srgbClr val="FFFFFF"/>
-                </a:solidFill>
-                <a:effectLst>
-                  <a:outerShdw blurRad="50800" dist="38100" dir="2700000" algn="tl" rotWithShape="0">
-                    <a:prstClr val="black">
-                      <a:alpha val="40000"/>
-                    </a:prstClr>
-                  </a:outerShdw>
-                </a:effectLst>
-                <a:latin typeface="Times New Roman" pitchFamily="18" charset="0"/>
-                <a:cs typeface="Times New Roman" pitchFamily="18" charset="0"/>
-              </a:rPr>
-              <a:t>dopytovani</a:t>
-            </a:r>
-            <a:r>
-              <a:rPr lang="sk-SK" sz="1200" kern="0" baseline="0" dirty="0" smtClean="0">
-                <a:ln w="18415" cmpd="sng">
-                  <a:noFill/>
-                  <a:prstDash val="solid"/>
-                </a:ln>
-                <a:solidFill>
-                  <a:srgbClr val="FFFFFF"/>
-                </a:solidFill>
-                <a:effectLst>
-                  <a:outerShdw blurRad="50800" dist="38100" dir="2700000" algn="tl" rotWithShape="0">
-                    <a:prstClr val="black">
-                      <a:alpha val="40000"/>
-                    </a:prstClr>
-                  </a:outerShdw>
-                </a:effectLst>
-                <a:latin typeface="Times New Roman" pitchFamily="18" charset="0"/>
-                <a:cs typeface="Times New Roman" pitchFamily="18" charset="0"/>
-              </a:rPr>
-              <a:t> do </a:t>
-            </a:r>
-            <a:r>
-              <a:rPr lang="sk-SK" sz="1200" kern="0" baseline="0" dirty="0" err="1" smtClean="0">
-                <a:ln w="18415" cmpd="sng">
-                  <a:noFill/>
-                  <a:prstDash val="solid"/>
-                </a:ln>
-                <a:solidFill>
-                  <a:srgbClr val="FFFFFF"/>
-                </a:solidFill>
-                <a:effectLst>
-                  <a:outerShdw blurRad="50800" dist="38100" dir="2700000" algn="tl" rotWithShape="0">
-                    <a:prstClr val="black">
-                      <a:alpha val="40000"/>
-                    </a:prstClr>
-                  </a:outerShdw>
-                </a:effectLst>
-                <a:latin typeface="Times New Roman" pitchFamily="18" charset="0"/>
-                <a:cs typeface="Times New Roman" pitchFamily="18" charset="0"/>
-              </a:rPr>
-              <a:t>Lua</a:t>
-            </a:r>
-            <a:r>
-              <a:rPr lang="sk-SK" sz="1200" kern="0" baseline="0" dirty="0" smtClean="0">
-                <a:ln w="18415" cmpd="sng">
-                  <a:noFill/>
-                  <a:prstDash val="solid"/>
-                </a:ln>
-                <a:solidFill>
-                  <a:srgbClr val="FFFFFF"/>
-                </a:solidFill>
-                <a:effectLst>
-                  <a:outerShdw blurRad="50800" dist="38100" dir="2700000" algn="tl" rotWithShape="0">
-                    <a:prstClr val="black">
-                      <a:alpha val="40000"/>
-                    </a:prstClr>
-                  </a:outerShdw>
-                </a:effectLst>
-                <a:latin typeface="Times New Roman" pitchFamily="18" charset="0"/>
-                <a:cs typeface="Times New Roman" pitchFamily="18" charset="0"/>
-              </a:rPr>
-              <a:t> </a:t>
-            </a:r>
-          </a:p>
-          <a:p>
-            <a:pPr>
-              <a:buFontTx/>
-              <a:buChar char="-"/>
-            </a:pPr>
-            <a:r>
-              <a:rPr lang="sk-SK" sz="1200" kern="0" baseline="0" dirty="0" smtClean="0">
-                <a:ln w="18415" cmpd="sng">
-                  <a:noFill/>
-                  <a:prstDash val="solid"/>
-                </a:ln>
-                <a:solidFill>
-                  <a:srgbClr val="FFFFFF"/>
-                </a:solidFill>
-                <a:effectLst>
-                  <a:outerShdw blurRad="50800" dist="38100" dir="2700000" algn="tl" rotWithShape="0">
-                    <a:prstClr val="black">
-                      <a:alpha val="40000"/>
-                    </a:prstClr>
-                  </a:outerShdw>
-                </a:effectLst>
-                <a:latin typeface="Times New Roman" pitchFamily="18" charset="0"/>
-                <a:cs typeface="Times New Roman" pitchFamily="18" charset="0"/>
-              </a:rPr>
-              <a:t>  dva  </a:t>
-            </a:r>
-            <a:r>
-              <a:rPr lang="sk-SK" sz="1200" kern="0" baseline="0" dirty="0" err="1" smtClean="0">
-                <a:ln w="18415" cmpd="sng">
-                  <a:noFill/>
-                  <a:prstDash val="solid"/>
-                </a:ln>
-                <a:solidFill>
-                  <a:srgbClr val="FFFFFF"/>
-                </a:solidFill>
-                <a:effectLst>
-                  <a:outerShdw blurRad="50800" dist="38100" dir="2700000" algn="tl" rotWithShape="0">
-                    <a:prstClr val="black">
-                      <a:alpha val="40000"/>
-                    </a:prstClr>
-                  </a:outerShdw>
-                </a:effectLst>
-                <a:latin typeface="Times New Roman" pitchFamily="18" charset="0"/>
-                <a:cs typeface="Times New Roman" pitchFamily="18" charset="0"/>
-              </a:rPr>
-              <a:t>mody</a:t>
-            </a:r>
-            <a:r>
-              <a:rPr lang="sk-SK" sz="1200" kern="0" baseline="0" dirty="0" smtClean="0">
-                <a:ln w="18415" cmpd="sng">
-                  <a:noFill/>
-                  <a:prstDash val="solid"/>
-                </a:ln>
-                <a:solidFill>
-                  <a:srgbClr val="FFFFFF"/>
-                </a:solidFill>
-                <a:effectLst>
-                  <a:outerShdw blurRad="50800" dist="38100" dir="2700000" algn="tl" rotWithShape="0">
-                    <a:prstClr val="black">
-                      <a:alpha val="40000"/>
-                    </a:prstClr>
-                  </a:outerShdw>
-                </a:effectLst>
-                <a:latin typeface="Times New Roman" pitchFamily="18" charset="0"/>
-                <a:cs typeface="Times New Roman" pitchFamily="18" charset="0"/>
-              </a:rPr>
-              <a:t> </a:t>
-            </a:r>
-            <a:r>
-              <a:rPr lang="sk-SK" sz="1200" kern="0" baseline="0" dirty="0" err="1" smtClean="0">
-                <a:ln w="18415" cmpd="sng">
-                  <a:noFill/>
-                  <a:prstDash val="solid"/>
-                </a:ln>
-                <a:solidFill>
-                  <a:srgbClr val="FFFFFF"/>
-                </a:solidFill>
-                <a:effectLst>
-                  <a:outerShdw blurRad="50800" dist="38100" dir="2700000" algn="tl" rotWithShape="0">
-                    <a:prstClr val="black">
-                      <a:alpha val="40000"/>
-                    </a:prstClr>
-                  </a:outerShdw>
-                </a:effectLst>
-                <a:latin typeface="Times New Roman" pitchFamily="18" charset="0"/>
-                <a:cs typeface="Times New Roman" pitchFamily="18" charset="0"/>
-              </a:rPr>
-              <a:t>ukazat</a:t>
-            </a:r>
-            <a:r>
-              <a:rPr lang="sk-SK" sz="1200" kern="0" baseline="0" dirty="0" smtClean="0">
-                <a:ln w="18415" cmpd="sng">
-                  <a:noFill/>
-                  <a:prstDash val="solid"/>
-                </a:ln>
-                <a:solidFill>
-                  <a:srgbClr val="FFFFFF"/>
-                </a:solidFill>
-                <a:effectLst>
-                  <a:outerShdw blurRad="50800" dist="38100" dir="2700000" algn="tl" rotWithShape="0">
-                    <a:prstClr val="black">
-                      <a:alpha val="40000"/>
-                    </a:prstClr>
-                  </a:outerShdw>
-                </a:effectLst>
-                <a:latin typeface="Times New Roman" pitchFamily="18" charset="0"/>
-                <a:cs typeface="Times New Roman" pitchFamily="18" charset="0"/>
-              </a:rPr>
-              <a:t> </a:t>
-            </a:r>
-            <a:endParaRPr lang="sk-SK" sz="1200" kern="0" dirty="0" smtClean="0">
-              <a:ln w="18415" cmpd="sng">
-                <a:noFill/>
-                <a:prstDash val="solid"/>
-              </a:ln>
-              <a:solidFill>
-                <a:srgbClr val="FFFFFF"/>
-              </a:solidFill>
-              <a:effectLst>
-                <a:outerShdw blurRad="50800" dist="38100" dir="2700000" algn="tl" rotWithShape="0">
-                  <a:prstClr val="black">
-                    <a:alpha val="40000"/>
-                  </a:prstClr>
-                </a:outerShdw>
-              </a:effectLst>
-              <a:latin typeface="Times New Roman" pitchFamily="18" charset="0"/>
-              <a:cs typeface="Times New Roman" pitchFamily="18" charset="0"/>
-            </a:endParaRPr>
-          </a:p>
         </p:txBody>
       </p:sp>
       <p:sp>
@@ -3541,7 +2584,97 @@
               <a:pPr/>
               <a:t>6</a:t>
             </a:fld>
+            <a:endParaRPr lang="sk-SK" dirty="0"/>
+          </a:p>
+        </p:txBody>
+      </p:sp>
+    </p:spTree>
+  </p:cSld>
+  <p:clrMapOvr>
+    <a:masterClrMapping/>
+  </p:clrMapOvr>
+</p:notes>
+</file>
+
+<file path=ppt/notesSlides/notesSlide6.xml><?xml version="1.0" encoding="utf-8"?>
+<p:notes xmlns:a="http://schemas.openxmlformats.org/drawingml/2006/main" xmlns:r="http://schemas.openxmlformats.org/officeDocument/2006/relationships" xmlns:p="http://schemas.openxmlformats.org/presentationml/2006/main">
+  <p:cSld>
+    <p:spTree>
+      <p:nvGrpSpPr>
+        <p:cNvPr id="1" name=""/>
+        <p:cNvGrpSpPr/>
+        <p:nvPr/>
+      </p:nvGrpSpPr>
+      <p:grpSpPr>
+        <a:xfrm>
+          <a:off x="0" y="0"/>
+          <a:ext cx="0" cy="0"/>
+          <a:chOff x="0" y="0"/>
+          <a:chExt cx="0" cy="0"/>
+        </a:xfrm>
+      </p:grpSpPr>
+      <p:sp>
+        <p:nvSpPr>
+          <p:cNvPr id="2" name="Zástupný symbol obrazu snímky 1"/>
+          <p:cNvSpPr>
+            <a:spLocks noGrp="1" noRot="1" noChangeAspect="1"/>
+          </p:cNvSpPr>
+          <p:nvPr>
+            <p:ph type="sldImg"/>
+          </p:nvPr>
+        </p:nvSpPr>
+        <p:spPr/>
+      </p:sp>
+      <p:sp>
+        <p:nvSpPr>
+          <p:cNvPr id="3" name="Zástupný symbol poznámok 2"/>
+          <p:cNvSpPr>
+            <a:spLocks noGrp="1"/>
+          </p:cNvSpPr>
+          <p:nvPr>
+            <p:ph type="body" idx="1"/>
+          </p:nvPr>
+        </p:nvSpPr>
+        <p:spPr/>
+        <p:txBody>
+          <a:bodyPr>
+            <a:normAutofit/>
+          </a:bodyPr>
+          <a:lstStyle/>
+          <a:p>
+            <a:r>
+              <a:rPr lang="sk-SK" smtClean="0"/>
+              <a:t>Tu</a:t>
+            </a:r>
+            <a:r>
+              <a:rPr lang="sk-SK" baseline="0" smtClean="0"/>
+              <a:t> by to chcelo nejake zhrnutie / výhody - Lukas</a:t>
+            </a:r>
             <a:endParaRPr lang="sk-SK"/>
+          </a:p>
+        </p:txBody>
+      </p:sp>
+      <p:sp>
+        <p:nvSpPr>
+          <p:cNvPr id="4" name="Zástupný symbol čísla snímky 3"/>
+          <p:cNvSpPr>
+            <a:spLocks noGrp="1"/>
+          </p:cNvSpPr>
+          <p:nvPr>
+            <p:ph type="sldNum" sz="quarter" idx="10"/>
+          </p:nvPr>
+        </p:nvSpPr>
+        <p:spPr/>
+        <p:txBody>
+          <a:bodyPr/>
+          <a:lstStyle/>
+          <a:p>
+            <a:fld id="{45D1DA62-001F-4525-B5C7-5BA4A19F932D}" type="slidenum">
+              <a:rPr lang="sk-SK" smtClean="0"/>
+              <a:pPr/>
+              <a:t>10</a:t>
+            </a:fld>
+            <a:endParaRPr lang="sk-SK" dirty="0"/>
           </a:p>
         </p:txBody>
       </p:sp>
@@ -3737,7 +2870,7 @@
               <a:pPr/>
               <a:t>4. 3. 2012</a:t>
             </a:fld>
-            <a:endParaRPr lang="sk-SK"/>
+            <a:endParaRPr lang="sk-SK" dirty="0"/>
           </a:p>
         </p:txBody>
       </p:sp>
@@ -3756,7 +2889,7 @@
           <a:bodyPr/>
           <a:lstStyle/>
           <a:p>
-            <a:endParaRPr lang="sk-SK"/>
+            <a:endParaRPr lang="sk-SK" dirty="0"/>
           </a:p>
         </p:txBody>
       </p:sp>
@@ -3780,7 +2913,7 @@
               <a:pPr/>
               <a:t>‹#›</a:t>
             </a:fld>
-            <a:endParaRPr lang="sk-SK"/>
+            <a:endParaRPr lang="sk-SK" dirty="0"/>
           </a:p>
         </p:txBody>
       </p:sp>
@@ -3904,7 +3037,7 @@
               <a:pPr/>
               <a:t>4. 3. 2012</a:t>
             </a:fld>
-            <a:endParaRPr lang="sk-SK"/>
+            <a:endParaRPr lang="sk-SK" dirty="0"/>
           </a:p>
         </p:txBody>
       </p:sp>
@@ -3923,7 +3056,7 @@
           <a:bodyPr/>
           <a:lstStyle/>
           <a:p>
-            <a:endParaRPr lang="sk-SK"/>
+            <a:endParaRPr lang="sk-SK" dirty="0"/>
           </a:p>
         </p:txBody>
       </p:sp>
@@ -3947,7 +3080,7 @@
               <a:pPr/>
               <a:t>‹#›</a:t>
             </a:fld>
-            <a:endParaRPr lang="sk-SK"/>
+            <a:endParaRPr lang="sk-SK" dirty="0"/>
           </a:p>
         </p:txBody>
       </p:sp>
@@ -4081,7 +3214,7 @@
               <a:pPr/>
               <a:t>4. 3. 2012</a:t>
             </a:fld>
-            <a:endParaRPr lang="sk-SK"/>
+            <a:endParaRPr lang="sk-SK" dirty="0"/>
           </a:p>
         </p:txBody>
       </p:sp>
@@ -4100,7 +3233,7 @@
           <a:bodyPr/>
           <a:lstStyle/>
           <a:p>
-            <a:endParaRPr lang="sk-SK"/>
+            <a:endParaRPr lang="sk-SK" dirty="0"/>
           </a:p>
         </p:txBody>
       </p:sp>
@@ -4124,7 +3257,7 @@
               <a:pPr/>
               <a:t>‹#›</a:t>
             </a:fld>
-            <a:endParaRPr lang="sk-SK"/>
+            <a:endParaRPr lang="sk-SK" dirty="0"/>
           </a:p>
         </p:txBody>
       </p:sp>
@@ -4326,7 +3459,7 @@
               <a:pPr/>
               <a:t>4. 3. 2012</a:t>
             </a:fld>
-            <a:endParaRPr lang="sk-SK">
+            <a:endParaRPr lang="sk-SK" dirty="0">
               <a:solidFill>
                 <a:prstClr val="black">
                   <a:tint val="75000"/>
@@ -4351,7 +3484,7 @@
           <a:bodyPr/>
           <a:lstStyle/>
           <a:p>
-            <a:endParaRPr lang="sk-SK">
+            <a:endParaRPr lang="sk-SK" dirty="0">
               <a:solidFill>
                 <a:prstClr val="black">
                   <a:tint val="75000"/>
@@ -4387,7 +3520,7 @@
               <a:pPr/>
               <a:t>‹#›</a:t>
             </a:fld>
-            <a:endParaRPr lang="sk-SK">
+            <a:endParaRPr lang="sk-SK" dirty="0">
               <a:solidFill>
                 <a:prstClr val="black">
                   <a:tint val="75000"/>
@@ -4523,7 +3656,7 @@
               <a:pPr/>
               <a:t>4. 3. 2012</a:t>
             </a:fld>
-            <a:endParaRPr lang="sk-SK">
+            <a:endParaRPr lang="sk-SK" dirty="0">
               <a:solidFill>
                 <a:prstClr val="black">
                   <a:tint val="75000"/>
@@ -4548,7 +3681,7 @@
           <a:bodyPr/>
           <a:lstStyle/>
           <a:p>
-            <a:endParaRPr lang="sk-SK">
+            <a:endParaRPr lang="sk-SK" dirty="0">
               <a:solidFill>
                 <a:prstClr val="black">
                   <a:tint val="75000"/>
@@ -4584,7 +3717,7 @@
               <a:pPr/>
               <a:t>‹#›</a:t>
             </a:fld>
-            <a:endParaRPr lang="sk-SK">
+            <a:endParaRPr lang="sk-SK" dirty="0">
               <a:solidFill>
                 <a:prstClr val="black">
                   <a:tint val="75000"/>
@@ -4796,7 +3929,7 @@
               <a:pPr/>
               <a:t>4. 3. 2012</a:t>
             </a:fld>
-            <a:endParaRPr lang="sk-SK">
+            <a:endParaRPr lang="sk-SK" dirty="0">
               <a:solidFill>
                 <a:prstClr val="black">
                   <a:tint val="75000"/>
@@ -4821,7 +3954,7 @@
           <a:bodyPr/>
           <a:lstStyle/>
           <a:p>
-            <a:endParaRPr lang="sk-SK">
+            <a:endParaRPr lang="sk-SK" dirty="0">
               <a:solidFill>
                 <a:prstClr val="black">
                   <a:tint val="75000"/>
@@ -4857,7 +3990,7 @@
               <a:pPr/>
               <a:t>‹#›</a:t>
             </a:fld>
-            <a:endParaRPr lang="sk-SK">
+            <a:endParaRPr lang="sk-SK" dirty="0">
               <a:solidFill>
                 <a:prstClr val="black">
                   <a:tint val="75000"/>
@@ -5111,7 +4244,7 @@
               <a:pPr/>
               <a:t>4. 3. 2012</a:t>
             </a:fld>
-            <a:endParaRPr lang="sk-SK">
+            <a:endParaRPr lang="sk-SK" dirty="0">
               <a:solidFill>
                 <a:prstClr val="black">
                   <a:tint val="75000"/>
@@ -5136,7 +4269,7 @@
           <a:bodyPr/>
           <a:lstStyle/>
           <a:p>
-            <a:endParaRPr lang="sk-SK">
+            <a:endParaRPr lang="sk-SK" dirty="0">
               <a:solidFill>
                 <a:prstClr val="black">
                   <a:tint val="75000"/>
@@ -5172,7 +4305,7 @@
               <a:pPr/>
               <a:t>‹#›</a:t>
             </a:fld>
-            <a:endParaRPr lang="sk-SK">
+            <a:endParaRPr lang="sk-SK" dirty="0">
               <a:solidFill>
                 <a:prstClr val="black">
                   <a:tint val="75000"/>
@@ -5560,7 +4693,7 @@
               <a:pPr/>
               <a:t>4. 3. 2012</a:t>
             </a:fld>
-            <a:endParaRPr lang="sk-SK">
+            <a:endParaRPr lang="sk-SK" dirty="0">
               <a:solidFill>
                 <a:prstClr val="black">
                   <a:tint val="75000"/>
@@ -5585,7 +4718,7 @@
           <a:bodyPr/>
           <a:lstStyle/>
           <a:p>
-            <a:endParaRPr lang="sk-SK">
+            <a:endParaRPr lang="sk-SK" dirty="0">
               <a:solidFill>
                 <a:prstClr val="black">
                   <a:tint val="75000"/>
@@ -5621,7 +4754,7 @@
               <a:pPr/>
               <a:t>‹#›</a:t>
             </a:fld>
-            <a:endParaRPr lang="sk-SK">
+            <a:endParaRPr lang="sk-SK" dirty="0">
               <a:solidFill>
                 <a:prstClr val="black">
                   <a:tint val="75000"/>
@@ -5705,7 +4838,7 @@
               <a:pPr/>
               <a:t>4. 3. 2012</a:t>
             </a:fld>
-            <a:endParaRPr lang="sk-SK">
+            <a:endParaRPr lang="sk-SK" dirty="0">
               <a:solidFill>
                 <a:prstClr val="black">
                   <a:tint val="75000"/>
@@ -5730,7 +4863,7 @@
           <a:bodyPr/>
           <a:lstStyle/>
           <a:p>
-            <a:endParaRPr lang="sk-SK">
+            <a:endParaRPr lang="sk-SK" dirty="0">
               <a:solidFill>
                 <a:prstClr val="black">
                   <a:tint val="75000"/>
@@ -5766,7 +4899,7 @@
               <a:pPr/>
               <a:t>‹#›</a:t>
             </a:fld>
-            <a:endParaRPr lang="sk-SK">
+            <a:endParaRPr lang="sk-SK" dirty="0">
               <a:solidFill>
                 <a:prstClr val="black">
                   <a:tint val="75000"/>
@@ -5827,7 +4960,7 @@
               <a:pPr/>
               <a:t>4. 3. 2012</a:t>
             </a:fld>
-            <a:endParaRPr lang="sk-SK">
+            <a:endParaRPr lang="sk-SK" dirty="0">
               <a:solidFill>
                 <a:prstClr val="black">
                   <a:tint val="75000"/>
@@ -5852,7 +4985,7 @@
           <a:bodyPr/>
           <a:lstStyle/>
           <a:p>
-            <a:endParaRPr lang="sk-SK">
+            <a:endParaRPr lang="sk-SK" dirty="0">
               <a:solidFill>
                 <a:prstClr val="black">
                   <a:tint val="75000"/>
@@ -5888,7 +5021,7 @@
               <a:pPr/>
               <a:t>‹#›</a:t>
             </a:fld>
-            <a:endParaRPr lang="sk-SK">
+            <a:endParaRPr lang="sk-SK" dirty="0">
               <a:solidFill>
                 <a:prstClr val="black">
                   <a:tint val="75000"/>
@@ -6131,7 +5264,7 @@
               <a:pPr/>
               <a:t>4. 3. 2012</a:t>
             </a:fld>
-            <a:endParaRPr lang="sk-SK">
+            <a:endParaRPr lang="sk-SK" dirty="0">
               <a:solidFill>
                 <a:prstClr val="black">
                   <a:tint val="75000"/>
@@ -6156,7 +5289,7 @@
           <a:bodyPr/>
           <a:lstStyle/>
           <a:p>
-            <a:endParaRPr lang="sk-SK">
+            <a:endParaRPr lang="sk-SK" dirty="0">
               <a:solidFill>
                 <a:prstClr val="black">
                   <a:tint val="75000"/>
@@ -6192,7 +5325,7 @@
               <a:pPr/>
               <a:t>‹#›</a:t>
             </a:fld>
-            <a:endParaRPr lang="sk-SK">
+            <a:endParaRPr lang="sk-SK" dirty="0">
               <a:solidFill>
                 <a:prstClr val="black">
                   <a:tint val="75000"/>
@@ -6322,7 +5455,7 @@
               <a:pPr/>
               <a:t>4. 3. 2012</a:t>
             </a:fld>
-            <a:endParaRPr lang="sk-SK"/>
+            <a:endParaRPr lang="sk-SK" dirty="0"/>
           </a:p>
         </p:txBody>
       </p:sp>
@@ -6341,7 +5474,7 @@
           <a:bodyPr/>
           <a:lstStyle/>
           <a:p>
-            <a:endParaRPr lang="sk-SK"/>
+            <a:endParaRPr lang="sk-SK" dirty="0"/>
           </a:p>
         </p:txBody>
       </p:sp>
@@ -6365,7 +5498,7 @@
               <a:pPr/>
               <a:t>‹#›</a:t>
             </a:fld>
-            <a:endParaRPr lang="sk-SK"/>
+            <a:endParaRPr lang="sk-SK" dirty="0"/>
           </a:p>
         </p:txBody>
       </p:sp>
@@ -6483,7 +5616,7 @@
             </a:lvl9pPr>
           </a:lstStyle>
           <a:p>
-            <a:endParaRPr lang="sk-SK"/>
+            <a:endParaRPr lang="sk-SK" dirty="0"/>
           </a:p>
         </p:txBody>
       </p:sp>
@@ -6578,7 +5711,7 @@
               <a:pPr/>
               <a:t>4. 3. 2012</a:t>
             </a:fld>
-            <a:endParaRPr lang="sk-SK">
+            <a:endParaRPr lang="sk-SK" dirty="0">
               <a:solidFill>
                 <a:prstClr val="black">
                   <a:tint val="75000"/>
@@ -6603,7 +5736,7 @@
           <a:bodyPr/>
           <a:lstStyle/>
           <a:p>
-            <a:endParaRPr lang="sk-SK">
+            <a:endParaRPr lang="sk-SK" dirty="0">
               <a:solidFill>
                 <a:prstClr val="black">
                   <a:tint val="75000"/>
@@ -6639,7 +5772,7 @@
               <a:pPr/>
               <a:t>‹#›</a:t>
             </a:fld>
-            <a:endParaRPr lang="sk-SK">
+            <a:endParaRPr lang="sk-SK" dirty="0">
               <a:solidFill>
                 <a:prstClr val="black">
                   <a:tint val="75000"/>
@@ -6775,7 +5908,7 @@
               <a:pPr/>
               <a:t>4. 3. 2012</a:t>
             </a:fld>
-            <a:endParaRPr lang="sk-SK">
+            <a:endParaRPr lang="sk-SK" dirty="0">
               <a:solidFill>
                 <a:prstClr val="black">
                   <a:tint val="75000"/>
@@ -6800,7 +5933,7 @@
           <a:bodyPr/>
           <a:lstStyle/>
           <a:p>
-            <a:endParaRPr lang="sk-SK">
+            <a:endParaRPr lang="sk-SK" dirty="0">
               <a:solidFill>
                 <a:prstClr val="black">
                   <a:tint val="75000"/>
@@ -6836,7 +5969,7 @@
               <a:pPr/>
               <a:t>‹#›</a:t>
             </a:fld>
-            <a:endParaRPr lang="sk-SK">
+            <a:endParaRPr lang="sk-SK" dirty="0">
               <a:solidFill>
                 <a:prstClr val="black">
                   <a:tint val="75000"/>
@@ -6982,7 +6115,7 @@
               <a:pPr/>
               <a:t>4. 3. 2012</a:t>
             </a:fld>
-            <a:endParaRPr lang="sk-SK">
+            <a:endParaRPr lang="sk-SK" dirty="0">
               <a:solidFill>
                 <a:prstClr val="black">
                   <a:tint val="75000"/>
@@ -7007,7 +6140,7 @@
           <a:bodyPr/>
           <a:lstStyle/>
           <a:p>
-            <a:endParaRPr lang="sk-SK">
+            <a:endParaRPr lang="sk-SK" dirty="0">
               <a:solidFill>
                 <a:prstClr val="black">
                   <a:tint val="75000"/>
@@ -7043,7 +6176,7 @@
               <a:pPr/>
               <a:t>‹#›</a:t>
             </a:fld>
-            <a:endParaRPr lang="sk-SK">
+            <a:endParaRPr lang="sk-SK" dirty="0">
               <a:solidFill>
                 <a:prstClr val="black">
                   <a:tint val="75000"/>
@@ -7249,7 +6382,7 @@
               <a:pPr/>
               <a:t>4. 3. 2012</a:t>
             </a:fld>
-            <a:endParaRPr lang="sk-SK"/>
+            <a:endParaRPr lang="sk-SK" dirty="0"/>
           </a:p>
         </p:txBody>
       </p:sp>
@@ -7268,7 +6401,7 @@
           <a:bodyPr/>
           <a:lstStyle/>
           <a:p>
-            <a:endParaRPr lang="sk-SK"/>
+            <a:endParaRPr lang="sk-SK" dirty="0"/>
           </a:p>
         </p:txBody>
       </p:sp>
@@ -7292,7 +6425,7 @@
               <a:pPr/>
               <a:t>‹#›</a:t>
             </a:fld>
-            <a:endParaRPr lang="sk-SK"/>
+            <a:endParaRPr lang="sk-SK" dirty="0"/>
           </a:p>
         </p:txBody>
       </p:sp>
@@ -7534,7 +6667,7 @@
               <a:pPr/>
               <a:t>4. 3. 2012</a:t>
             </a:fld>
-            <a:endParaRPr lang="sk-SK"/>
+            <a:endParaRPr lang="sk-SK" dirty="0"/>
           </a:p>
         </p:txBody>
       </p:sp>
@@ -7553,7 +6686,7 @@
           <a:bodyPr/>
           <a:lstStyle/>
           <a:p>
-            <a:endParaRPr lang="sk-SK"/>
+            <a:endParaRPr lang="sk-SK" dirty="0"/>
           </a:p>
         </p:txBody>
       </p:sp>
@@ -7577,7 +6710,7 @@
               <a:pPr/>
               <a:t>‹#›</a:t>
             </a:fld>
-            <a:endParaRPr lang="sk-SK"/>
+            <a:endParaRPr lang="sk-SK" dirty="0"/>
           </a:p>
         </p:txBody>
       </p:sp>
@@ -7958,7 +7091,7 @@
               <a:pPr/>
               <a:t>4. 3. 2012</a:t>
             </a:fld>
-            <a:endParaRPr lang="sk-SK"/>
+            <a:endParaRPr lang="sk-SK" dirty="0"/>
           </a:p>
         </p:txBody>
       </p:sp>
@@ -7977,7 +7110,7 @@
           <a:bodyPr/>
           <a:lstStyle/>
           <a:p>
-            <a:endParaRPr lang="sk-SK"/>
+            <a:endParaRPr lang="sk-SK" dirty="0"/>
           </a:p>
         </p:txBody>
       </p:sp>
@@ -8001,7 +7134,7 @@
               <a:pPr/>
               <a:t>‹#›</a:t>
             </a:fld>
-            <a:endParaRPr lang="sk-SK"/>
+            <a:endParaRPr lang="sk-SK" dirty="0"/>
           </a:p>
         </p:txBody>
       </p:sp>
@@ -8073,7 +7206,7 @@
               <a:pPr/>
               <a:t>4. 3. 2012</a:t>
             </a:fld>
-            <a:endParaRPr lang="sk-SK"/>
+            <a:endParaRPr lang="sk-SK" dirty="0"/>
           </a:p>
         </p:txBody>
       </p:sp>
@@ -8092,7 +7225,7 @@
           <a:bodyPr/>
           <a:lstStyle/>
           <a:p>
-            <a:endParaRPr lang="sk-SK"/>
+            <a:endParaRPr lang="sk-SK" dirty="0"/>
           </a:p>
         </p:txBody>
       </p:sp>
@@ -8116,7 +7249,7 @@
               <a:pPr/>
               <a:t>‹#›</a:t>
             </a:fld>
-            <a:endParaRPr lang="sk-SK"/>
+            <a:endParaRPr lang="sk-SK" dirty="0"/>
           </a:p>
         </p:txBody>
       </p:sp>
@@ -8165,7 +7298,7 @@
               <a:pPr/>
               <a:t>4. 3. 2012</a:t>
             </a:fld>
-            <a:endParaRPr lang="sk-SK"/>
+            <a:endParaRPr lang="sk-SK" dirty="0"/>
           </a:p>
         </p:txBody>
       </p:sp>
@@ -8184,7 +7317,7 @@
           <a:bodyPr/>
           <a:lstStyle/>
           <a:p>
-            <a:endParaRPr lang="sk-SK"/>
+            <a:endParaRPr lang="sk-SK" dirty="0"/>
           </a:p>
         </p:txBody>
       </p:sp>
@@ -8208,7 +7341,7 @@
               <a:pPr/>
               <a:t>‹#›</a:t>
             </a:fld>
-            <a:endParaRPr lang="sk-SK"/>
+            <a:endParaRPr lang="sk-SK" dirty="0"/>
           </a:p>
         </p:txBody>
       </p:sp>
@@ -8439,7 +7572,7 @@
               <a:pPr/>
               <a:t>4. 3. 2012</a:t>
             </a:fld>
-            <a:endParaRPr lang="sk-SK"/>
+            <a:endParaRPr lang="sk-SK" dirty="0"/>
           </a:p>
         </p:txBody>
       </p:sp>
@@ -8458,7 +7591,7 @@
           <a:bodyPr/>
           <a:lstStyle/>
           <a:p>
-            <a:endParaRPr lang="sk-SK"/>
+            <a:endParaRPr lang="sk-SK" dirty="0"/>
           </a:p>
         </p:txBody>
       </p:sp>
@@ -8482,7 +7615,7 @@
               <a:pPr/>
               <a:t>‹#›</a:t>
             </a:fld>
-            <a:endParaRPr lang="sk-SK"/>
+            <a:endParaRPr lang="sk-SK" dirty="0"/>
           </a:p>
         </p:txBody>
       </p:sp>
@@ -8600,7 +7733,7 @@
             </a:lvl9pPr>
           </a:lstStyle>
           <a:p>
-            <a:endParaRPr lang="sk-SK"/>
+            <a:endParaRPr lang="sk-SK" dirty="0"/>
           </a:p>
         </p:txBody>
       </p:sp>
@@ -8689,7 +7822,7 @@
               <a:pPr/>
               <a:t>4. 3. 2012</a:t>
             </a:fld>
-            <a:endParaRPr lang="sk-SK"/>
+            <a:endParaRPr lang="sk-SK" dirty="0"/>
           </a:p>
         </p:txBody>
       </p:sp>
@@ -8708,7 +7841,7 @@
           <a:bodyPr/>
           <a:lstStyle/>
           <a:p>
-            <a:endParaRPr lang="sk-SK"/>
+            <a:endParaRPr lang="sk-SK" dirty="0"/>
           </a:p>
         </p:txBody>
       </p:sp>
@@ -8732,7 +7865,7 @@
               <a:pPr/>
               <a:t>‹#›</a:t>
             </a:fld>
-            <a:endParaRPr lang="sk-SK"/>
+            <a:endParaRPr lang="sk-SK" dirty="0"/>
           </a:p>
         </p:txBody>
       </p:sp>
@@ -8899,7 +8032,7 @@
               <a:pPr/>
               <a:t>4. 3. 2012</a:t>
             </a:fld>
-            <a:endParaRPr lang="sk-SK"/>
+            <a:endParaRPr lang="sk-SK" dirty="0"/>
           </a:p>
         </p:txBody>
       </p:sp>
@@ -8936,7 +8069,7 @@
             </a:lvl1pPr>
           </a:lstStyle>
           <a:p>
-            <a:endParaRPr lang="sk-SK"/>
+            <a:endParaRPr lang="sk-SK" dirty="0"/>
           </a:p>
         </p:txBody>
       </p:sp>
@@ -8978,7 +8111,7 @@
               <a:pPr/>
               <a:t>‹#›</a:t>
             </a:fld>
-            <a:endParaRPr lang="sk-SK"/>
+            <a:endParaRPr lang="sk-SK" dirty="0"/>
           </a:p>
         </p:txBody>
       </p:sp>
@@ -9435,7 +8568,7 @@
               <a:pPr/>
               <a:t>4. 3. 2012</a:t>
             </a:fld>
-            <a:endParaRPr lang="sk-SK">
+            <a:endParaRPr lang="sk-SK" dirty="0">
               <a:solidFill>
                 <a:prstClr val="black">
                   <a:tint val="75000"/>
@@ -9478,7 +8611,7 @@
             </a:lvl1pPr>
           </a:lstStyle>
           <a:p>
-            <a:endParaRPr lang="sk-SK">
+            <a:endParaRPr lang="sk-SK" dirty="0">
               <a:solidFill>
                 <a:prstClr val="black">
                   <a:tint val="75000"/>
@@ -9532,7 +8665,7 @@
               <a:pPr/>
               <a:t>‹#›</a:t>
             </a:fld>
-            <a:endParaRPr lang="sk-SK">
+            <a:endParaRPr lang="sk-SK" dirty="0">
               <a:solidFill>
                 <a:prstClr val="black">
                   <a:tint val="75000"/>
@@ -10112,27 +9245,7 @@
                   <a:latin typeface="Trebuchet MS" pitchFamily="34" charset="0"/>
                   <a:cs typeface="Aharoni" pitchFamily="2" charset="-79"/>
                 </a:rPr>
-                <a:t>r</a:t>
-              </a:r>
-              <a:r>
-                <a:rPr lang="sk-SK" sz="8800" b="1" spc="-300" dirty="0" smtClean="0">
-                  <a:solidFill>
-                    <a:schemeClr val="tx1">
-                      <a:lumMod val="95000"/>
-                      <a:lumOff val="5000"/>
-                    </a:schemeClr>
-                  </a:solidFill>
-                  <a:effectLst>
-                    <a:outerShdw blurRad="50800" dist="38100" dir="18900000" algn="bl" rotWithShape="0">
-                      <a:prstClr val="black">
-                        <a:alpha val="40000"/>
-                      </a:prstClr>
-                    </a:outerShdw>
-                  </a:effectLst>
-                  <a:latin typeface="Trebuchet MS" pitchFamily="34" charset="0"/>
-                  <a:cs typeface="Aharoni" pitchFamily="2" charset="-79"/>
-                </a:rPr>
-                <a:t>oll</a:t>
+                <a:t>roll</a:t>
               </a:r>
               <a:r>
                 <a:rPr lang="sk-SK" sz="7600" spc="-300" dirty="0" smtClean="0">
@@ -10218,25 +9331,7 @@
                     </a:outerShdw>
                   </a:effectLst>
                 </a:rPr>
-                <a:t>text </a:t>
-              </a:r>
-              <a:r>
-                <a:rPr lang="en-US" sz="1050" dirty="0" smtClean="0">
-                  <a:solidFill>
-                    <a:schemeClr val="tx1">
-                      <a:lumMod val="85000"/>
-                      <a:lumOff val="15000"/>
-                    </a:schemeClr>
-                  </a:solidFill>
-                  <a:effectLst>
-                    <a:outerShdw blurRad="50800" dist="38100" dir="16200000" rotWithShape="0">
-                      <a:prstClr val="black">
-                        <a:alpha val="40000"/>
-                      </a:prstClr>
-                    </a:outerShdw>
-                  </a:effectLst>
-                </a:rPr>
-                <a:t>editor with graphical enhancements</a:t>
+                <a:t>text editor with graphical enhancements</a:t>
               </a:r>
               <a:endParaRPr lang="sk-SK" sz="1100" dirty="0">
                 <a:solidFill>
@@ -10297,7 +9392,7 @@
             <a:lstStyle/>
             <a:p>
               <a:pPr algn="ctr"/>
-              <a:endParaRPr lang="sk-SK">
+              <a:endParaRPr lang="sk-SK" dirty="0">
                 <a:ln w="18415" cmpd="sng">
                   <a:solidFill>
                     <a:srgbClr val="FFFFFF"/>
@@ -10399,7 +9494,7 @@
             <a:lstStyle/>
             <a:p>
               <a:pPr algn="ctr"/>
-              <a:endParaRPr lang="sk-SK">
+              <a:endParaRPr lang="sk-SK" dirty="0">
                 <a:ln w="18415" cmpd="sng">
                   <a:solidFill>
                     <a:srgbClr val="FFFFFF"/>
@@ -10504,7 +9599,7 @@
           <p:nvPr/>
         </p:nvPicPr>
         <p:blipFill>
-          <a:blip r:embed="rId2" cstate="print"/>
+          <a:blip r:embed="rId3" cstate="print"/>
           <a:stretch>
             <a:fillRect/>
           </a:stretch>
@@ -12018,25 +11113,11 @@
               <a:t>    myšlienku dokumentačného programovania </a:t>
             </a:r>
             <a:r>
-              <a:rPr lang="sk-SK" sz="1600" i="1" dirty="0" err="1" smtClean="0">
-                <a:latin typeface="Arial" pitchFamily="34" charset="0"/>
-                <a:cs typeface="Arial" pitchFamily="34" charset="0"/>
-              </a:rPr>
-              <a:t>literate</a:t>
-            </a:r>
-            <a:r>
               <a:rPr lang="sk-SK" sz="1600" i="1" dirty="0" smtClean="0">
                 <a:latin typeface="Arial" pitchFamily="34" charset="0"/>
                 <a:cs typeface="Arial" pitchFamily="34" charset="0"/>
               </a:rPr>
-              <a:t> </a:t>
-            </a:r>
-            <a:r>
-              <a:rPr lang="sk-SK" sz="1600" i="1" dirty="0" err="1" smtClean="0">
-                <a:latin typeface="Arial" pitchFamily="34" charset="0"/>
-                <a:cs typeface="Arial" pitchFamily="34" charset="0"/>
-              </a:rPr>
-              <a:t>programming</a:t>
+              <a:t>literate</a:t>
             </a:r>
             <a:r>
               <a:rPr lang="sk-SK" sz="1600" i="1" dirty="0" smtClean="0">
@@ -12046,6 +11127,20 @@
               <a:t> </a:t>
             </a:r>
             <a:r>
+              <a:rPr lang="sk-SK" sz="1600" i="1" dirty="0" smtClean="0">
+                <a:latin typeface="Arial" pitchFamily="34" charset="0"/>
+                <a:cs typeface="Arial" pitchFamily="34" charset="0"/>
+              </a:rPr>
+              <a:t>programming</a:t>
+            </a:r>
+            <a:r>
+              <a:rPr lang="sk-SK" sz="1600" i="1" dirty="0" smtClean="0">
+                <a:latin typeface="Arial" pitchFamily="34" charset="0"/>
+                <a:cs typeface="Arial" pitchFamily="34" charset="0"/>
+              </a:rPr>
+              <a:t> </a:t>
+            </a:r>
+            <a:r>
               <a:rPr lang="sk-SK" sz="1600" dirty="0" smtClean="0">
                 <a:latin typeface="Arial" pitchFamily="34" charset="0"/>
                 <a:cs typeface="Arial" pitchFamily="34" charset="0"/>
@@ -12071,21 +11166,21 @@
               <a:t>                                                                                                                    </a:t>
             </a:r>
             <a:r>
-              <a:rPr lang="sk-SK" sz="1600" i="1" dirty="0" err="1" smtClean="0">
-                <a:latin typeface="Arial" pitchFamily="34" charset="0"/>
-                <a:cs typeface="Arial" pitchFamily="34" charset="0"/>
-              </a:rPr>
-              <a:t>Donalda</a:t>
-            </a:r>
-            <a:r>
               <a:rPr lang="sk-SK" sz="1600" i="1" dirty="0" smtClean="0">
                 <a:latin typeface="Arial" pitchFamily="34" charset="0"/>
                 <a:cs typeface="Arial" pitchFamily="34" charset="0"/>
               </a:rPr>
+              <a:t>Donalda</a:t>
+            </a:r>
+            <a:r>
+              <a:rPr lang="sk-SK" sz="1600" i="1" dirty="0" smtClean="0">
+                <a:latin typeface="Arial" pitchFamily="34" charset="0"/>
+                <a:cs typeface="Arial" pitchFamily="34" charset="0"/>
+              </a:rPr>
               <a:t> </a:t>
             </a:r>
             <a:r>
-              <a:rPr lang="sk-SK" sz="1600" i="1" dirty="0" err="1" smtClean="0">
+              <a:rPr lang="sk-SK" sz="1600" i="1" dirty="0" smtClean="0">
                 <a:latin typeface="Arial" pitchFamily="34" charset="0"/>
                 <a:cs typeface="Arial" pitchFamily="34" charset="0"/>
               </a:rPr>
@@ -12353,7 +11448,21 @@
                 <a:latin typeface="Arial" pitchFamily="34" charset="0"/>
                 <a:cs typeface="Arial" pitchFamily="34" charset="0"/>
               </a:rPr>
-              <a:t>                                            Použite technológie </a:t>
+              <a:t>                                            </a:t>
+            </a:r>
+            <a:r>
+              <a:rPr lang="sk-SK" sz="2400" b="1" dirty="0" smtClean="0">
+                <a:latin typeface="Arial" pitchFamily="34" charset="0"/>
+                <a:cs typeface="Arial" pitchFamily="34" charset="0"/>
+              </a:rPr>
+              <a:t>Použité </a:t>
+            </a:r>
+            <a:r>
+              <a:rPr lang="sk-SK" sz="2400" b="1" dirty="0" smtClean="0">
+                <a:latin typeface="Arial" pitchFamily="34" charset="0"/>
+                <a:cs typeface="Arial" pitchFamily="34" charset="0"/>
+              </a:rPr>
+              <a:t>technológie </a:t>
             </a:r>
             <a:endParaRPr lang="sk-SK" sz="2400" b="1" dirty="0">
               <a:latin typeface="Arial" pitchFamily="34" charset="0"/>
@@ -12491,7 +11600,7 @@
           <a:lstStyle/>
           <a:p>
             <a:r>
-              <a:rPr lang="sk-SK" sz="1200" dirty="0" smtClean="0">
+              <a:rPr lang="sk-SK" sz="1200" b="1" dirty="0" smtClean="0">
                 <a:solidFill>
                   <a:schemeClr val="bg1">
                     <a:lumMod val="50000"/>
@@ -12500,7 +11609,7 @@
               </a:rPr>
               <a:t>C++</a:t>
             </a:r>
-            <a:endParaRPr lang="sk-SK" sz="1200" dirty="0">
+            <a:endParaRPr lang="sk-SK" sz="1200" b="1" dirty="0">
               <a:solidFill>
                 <a:schemeClr val="bg1">
                   <a:lumMod val="50000"/>
@@ -12533,7 +11642,7 @@
           <a:lstStyle/>
           <a:p>
             <a:r>
-              <a:rPr lang="sk-SK" sz="1200" dirty="0" err="1" smtClean="0">
+              <a:rPr lang="sk-SK" sz="1200" b="1" dirty="0" smtClean="0">
                 <a:solidFill>
                   <a:schemeClr val="bg1">
                     <a:lumMod val="50000"/>
@@ -12542,7 +11651,7 @@
               </a:rPr>
               <a:t>Redmine</a:t>
             </a:r>
-            <a:endParaRPr lang="sk-SK" sz="1200" dirty="0">
+            <a:endParaRPr lang="sk-SK" sz="1200" b="1" dirty="0">
               <a:solidFill>
                 <a:schemeClr val="bg1">
                   <a:lumMod val="50000"/>
@@ -12575,7 +11684,7 @@
           <a:lstStyle/>
           <a:p>
             <a:r>
-              <a:rPr lang="sk-SK" sz="1200" dirty="0" err="1" smtClean="0">
+              <a:rPr lang="sk-SK" sz="1200" b="1" dirty="0" smtClean="0">
                 <a:solidFill>
                   <a:schemeClr val="bg1">
                     <a:lumMod val="50000"/>
@@ -12584,7 +11693,7 @@
               </a:rPr>
               <a:t>Lpeg</a:t>
             </a:r>
-            <a:endParaRPr lang="sk-SK" sz="1200" dirty="0">
+            <a:endParaRPr lang="sk-SK" sz="1200" b="1" dirty="0">
               <a:solidFill>
                 <a:schemeClr val="bg1">
                   <a:lumMod val="50000"/>
@@ -12617,7 +11726,7 @@
           <a:lstStyle/>
           <a:p>
             <a:r>
-              <a:rPr lang="sk-SK" sz="1200" dirty="0" err="1" smtClean="0">
+              <a:rPr lang="sk-SK" sz="1200" b="1" dirty="0" smtClean="0">
                 <a:solidFill>
                   <a:schemeClr val="bg1">
                     <a:lumMod val="50000"/>
@@ -12626,7 +11735,7 @@
               </a:rPr>
               <a:t>LuaJit</a:t>
             </a:r>
-            <a:endParaRPr lang="sk-SK" sz="1200" dirty="0">
+            <a:endParaRPr lang="sk-SK" sz="1200" b="1" dirty="0">
               <a:solidFill>
                 <a:schemeClr val="bg1">
                   <a:lumMod val="50000"/>
@@ -12659,7 +11768,7 @@
           <a:lstStyle/>
           <a:p>
             <a:r>
-              <a:rPr lang="sk-SK" sz="1200" dirty="0" err="1" smtClean="0">
+              <a:rPr lang="sk-SK" sz="1200" b="1" dirty="0" smtClean="0">
                 <a:solidFill>
                   <a:schemeClr val="bg1">
                     <a:lumMod val="50000"/>
@@ -12668,7 +11777,7 @@
               </a:rPr>
               <a:t>Qml</a:t>
             </a:r>
-            <a:endParaRPr lang="sk-SK" sz="1200" dirty="0">
+            <a:endParaRPr lang="sk-SK" sz="1200" b="1" dirty="0">
               <a:solidFill>
                 <a:schemeClr val="bg1">
                   <a:lumMod val="50000"/>
@@ -12701,7 +11810,7 @@
           <a:lstStyle/>
           <a:p>
             <a:r>
-              <a:rPr lang="sk-SK" sz="1200" dirty="0" smtClean="0">
+              <a:rPr lang="sk-SK" sz="1200" b="1" dirty="0" smtClean="0">
                 <a:solidFill>
                   <a:schemeClr val="bg1">
                     <a:lumMod val="50000"/>
@@ -12712,7 +11821,7 @@
             </a:r>
           </a:p>
           <a:p>
-            <a:endParaRPr lang="sk-SK" sz="1200" dirty="0">
+            <a:endParaRPr lang="sk-SK" sz="1200" b="1" dirty="0">
               <a:solidFill>
                 <a:schemeClr val="bg1">
                   <a:lumMod val="50000"/>
@@ -12731,7 +11840,7 @@
         <p:spPr>
           <a:xfrm>
             <a:off x="4499992" y="5017740"/>
-            <a:ext cx="576064" cy="276999"/>
+            <a:ext cx="714950" cy="276999"/>
           </a:xfrm>
           <a:prstGeom prst="rect">
             <a:avLst/>
@@ -12745,7 +11854,7 @@
           <a:lstStyle/>
           <a:p>
             <a:r>
-              <a:rPr lang="sk-SK" sz="1200" dirty="0" err="1" smtClean="0">
+              <a:rPr lang="sk-SK" sz="1200" b="1" dirty="0" smtClean="0">
                 <a:solidFill>
                   <a:schemeClr val="bg1">
                     <a:lumMod val="50000"/>
@@ -12754,7 +11863,7 @@
               </a:rPr>
               <a:t>CDash</a:t>
             </a:r>
-            <a:endParaRPr lang="sk-SK" sz="1200" dirty="0">
+            <a:endParaRPr lang="sk-SK" sz="1200" b="1" dirty="0">
               <a:solidFill>
                 <a:schemeClr val="bg1">
                   <a:lumMod val="50000"/>
@@ -12784,6 +11893,9 @@
                     <p:cTn id="3" fill="hold">
                       <p:stCondLst>
                         <p:cond delay="indefinite"/>
+                        <p:cond evt="onBegin" delay="0">
+                          <p:tn val="2"/>
+                        </p:cond>
                       </p:stCondLst>
                       <p:childTnLst>
                         <p:par>
@@ -12793,7 +11905,7 @@
                             </p:stCondLst>
                             <p:childTnLst>
                               <p:par>
-                                <p:cTn id="5" presetID="53" presetClass="entr" presetSubtype="0" fill="hold" nodeType="clickEffect">
+                                <p:cTn id="5" presetID="53" presetClass="entr" presetSubtype="0" fill="hold" nodeType="afterEffect">
                                   <p:stCondLst>
                                     <p:cond delay="0"/>
                                   </p:stCondLst>
@@ -14085,67 +13197,67 @@
           </a:p>
           <a:p>
             <a:r>
-              <a:rPr lang="sk-SK" sz="1400" dirty="0" err="1" smtClean="0">
-                <a:latin typeface="Arial" pitchFamily="34" charset="0"/>
-                <a:cs typeface="Arial" pitchFamily="34" charset="0"/>
-              </a:rPr>
-              <a:t>Abstract</a:t>
-            </a:r>
-            <a:r>
               <a:rPr lang="sk-SK" sz="1400" dirty="0" smtClean="0">
                 <a:latin typeface="Arial" pitchFamily="34" charset="0"/>
                 <a:cs typeface="Arial" pitchFamily="34" charset="0"/>
               </a:rPr>
-              <a:t> Syntax </a:t>
-            </a:r>
-            <a:r>
-              <a:rPr lang="sk-SK" sz="1400" dirty="0" err="1" smtClean="0">
-                <a:latin typeface="Arial" pitchFamily="34" charset="0"/>
-                <a:cs typeface="Arial" pitchFamily="34" charset="0"/>
-              </a:rPr>
-              <a:t>Tree</a:t>
+              <a:t>Abstract</a:t>
             </a:r>
             <a:r>
               <a:rPr lang="sk-SK" sz="1400" dirty="0" smtClean="0">
                 <a:latin typeface="Arial" pitchFamily="34" charset="0"/>
                 <a:cs typeface="Arial" pitchFamily="34" charset="0"/>
               </a:rPr>
-              <a:t> – stromová reprezentácia štruktúry zdrojového kódu</a:t>
-            </a:r>
-          </a:p>
-          <a:p>
+              <a:t> Syntax </a:t>
+            </a:r>
             <a:r>
               <a:rPr lang="sk-SK" sz="1400" dirty="0" smtClean="0">
                 <a:latin typeface="Arial" pitchFamily="34" charset="0"/>
                 <a:cs typeface="Arial" pitchFamily="34" charset="0"/>
               </a:rPr>
-              <a:t>Abstraktný = neviaže sa na konkrétny programovací jazyk</a:t>
-            </a:r>
-          </a:p>
-          <a:p>
+              <a:t>Tree</a:t>
+            </a:r>
             <a:r>
               <a:rPr lang="sk-SK" sz="1400" dirty="0" smtClean="0">
                 <a:latin typeface="Arial" pitchFamily="34" charset="0"/>
                 <a:cs typeface="Arial" pitchFamily="34" charset="0"/>
               </a:rPr>
-              <a:t>//  </a:t>
-            </a:r>
-            <a:r>
-              <a:rPr lang="sk-SK" sz="1400" dirty="0" err="1" smtClean="0">
-                <a:latin typeface="Arial" pitchFamily="34" charset="0"/>
-                <a:cs typeface="Arial" pitchFamily="34" charset="0"/>
-              </a:rPr>
-              <a:t>popisat</a:t>
-            </a:r>
+              <a:t> – stromová reprezentácia štruktúry zdrojového kódu</a:t>
+            </a:r>
+          </a:p>
+          <a:p>
             <a:r>
               <a:rPr lang="sk-SK" sz="1400" dirty="0" smtClean="0">
                 <a:latin typeface="Arial" pitchFamily="34" charset="0"/>
                 <a:cs typeface="Arial" pitchFamily="34" charset="0"/>
               </a:rPr>
+              <a:t>Abstraktný = neviaže sa na konkrétny programovací jazyk</a:t>
+            </a:r>
+          </a:p>
+          <a:p>
+            <a:r>
+              <a:rPr lang="sk-SK" sz="1400" dirty="0" smtClean="0">
+                <a:latin typeface="Arial" pitchFamily="34" charset="0"/>
+                <a:cs typeface="Arial" pitchFamily="34" charset="0"/>
+              </a:rPr>
+              <a:t>//  </a:t>
+            </a:r>
+            <a:r>
+              <a:rPr lang="sk-SK" sz="1400" dirty="0" smtClean="0">
+                <a:latin typeface="Arial" pitchFamily="34" charset="0"/>
+                <a:cs typeface="Arial" pitchFamily="34" charset="0"/>
+              </a:rPr>
+              <a:t>popisat</a:t>
+            </a:r>
+            <a:r>
+              <a:rPr lang="sk-SK" sz="1400" dirty="0" smtClean="0">
+                <a:latin typeface="Arial" pitchFamily="34" charset="0"/>
+                <a:cs typeface="Arial" pitchFamily="34" charset="0"/>
+              </a:rPr>
               <a:t> ako pracuje editor ako sa </a:t>
             </a:r>
             <a:r>
-              <a:rPr lang="sk-SK" sz="1400" dirty="0" err="1" smtClean="0">
+              <a:rPr lang="sk-SK" sz="1400" dirty="0" smtClean="0">
                 <a:latin typeface="Arial" pitchFamily="34" charset="0"/>
                 <a:cs typeface="Arial" pitchFamily="34" charset="0"/>
               </a:rPr>
@@ -14232,7 +13344,7 @@
             <a:lstStyle/>
             <a:p>
               <a:pPr algn="ctr"/>
-              <a:endParaRPr lang="sk-SK">
+              <a:endParaRPr lang="sk-SK" dirty="0">
                 <a:solidFill>
                   <a:schemeClr val="bg1"/>
                 </a:solidFill>
@@ -14252,7 +13364,7 @@
             <a:blip r:embed="rId3" cstate="print">
               <a:extLst>
                 <a:ext uri="{28A0092B-C50C-407E-A947-70E740481C1C}">
-                  <a14:useLocalDpi xmlns="" xmlns:a14="http://schemas.microsoft.com/office/drawing/2010/main" val="0"/>
+                  <a14:useLocalDpi xmlns:a14="http://schemas.microsoft.com/office/drawing/2010/main" xmlns="" val="0"/>
                 </a:ext>
               </a:extLst>
             </a:blip>
@@ -14276,14 +13388,14 @@
             <a:effectLst/>
             <a:extLst>
               <a:ext uri="{909E8E84-426E-40DD-AFC4-6F175D3DCCD1}">
-                <a14:hiddenFill xmlns="" xmlns:a14="http://schemas.microsoft.com/office/drawing/2010/main">
+                <a14:hiddenFill xmlns:a14="http://schemas.microsoft.com/office/drawing/2010/main" xmlns="">
                   <a:solidFill>
                     <a:schemeClr val="accent1"/>
                   </a:solidFill>
                 </a14:hiddenFill>
               </a:ext>
               <a:ext uri="{91240B29-F687-4F45-9708-019B960494DF}">
-                <a14:hiddenLine xmlns="" xmlns:a14="http://schemas.microsoft.com/office/drawing/2010/main" w="9525">
+                <a14:hiddenLine xmlns:a14="http://schemas.microsoft.com/office/drawing/2010/main" xmlns="" w="9525">
                   <a:solidFill>
                     <a:schemeClr val="tx1"/>
                   </a:solidFill>
@@ -14293,7 +13405,7 @@
                 </a14:hiddenLine>
               </a:ext>
               <a:ext uri="{AF507438-7753-43E0-B8FC-AC1667EBCBE1}">
-                <a14:hiddenEffects xmlns="" xmlns:a14="http://schemas.microsoft.com/office/drawing/2010/main">
+                <a14:hiddenEffects xmlns:a14="http://schemas.microsoft.com/office/drawing/2010/main" xmlns="">
                   <a:effectLst>
                     <a:outerShdw dist="35921" dir="2700000" algn="ctr" rotWithShape="0">
                       <a:schemeClr val="bg2"/>
@@ -14310,6 +13422,9 @@
   <p:clrMapOvr>
     <a:masterClrMapping/>
   </p:clrMapOvr>
+  <p:transition>
+    <p:push/>
+  </p:transition>
   <p:timing>
     <p:tnLst>
       <p:par>
@@ -14548,7 +13663,7 @@
               <a:t>d</a:t>
             </a:r>
             <a:r>
-              <a:rPr kumimoji="0" lang="en-US" sz="13200" u="none" strike="noStrike" kern="0" cap="none" spc="-300" normalizeH="0" baseline="0" noProof="0" dirty="0" err="1" smtClean="0">
+              <a:rPr kumimoji="0" lang="en-US" sz="13200" u="none" strike="noStrike" kern="0" cap="none" spc="-300" normalizeH="0" baseline="0" noProof="0" dirty="0" smtClean="0">
                 <a:ln w="18415" cmpd="sng">
                   <a:noFill/>
                   <a:prstDash val="solid"/>
@@ -14829,12 +13944,13 @@
           </a:bodyPr>
           <a:lstStyle/>
           <a:p>
-            <a:r>
-              <a:rPr lang="sk-SK" sz="2400" b="1" dirty="0" smtClean="0">
+            <a:pPr algn="r"/>
+            <a:r>
+              <a:rPr lang="sk-SK" sz="2400" b="1" smtClean="0">
                 <a:latin typeface="Arial" pitchFamily="34" charset="0"/>
                 <a:cs typeface="Arial" pitchFamily="34" charset="0"/>
               </a:rPr>
-              <a:t>                                               Čo ešte plánujeme </a:t>
+              <a:t>Čo by sme chceli dosiahnuť</a:t>
             </a:r>
             <a:endParaRPr lang="sk-SK" sz="2400" b="1" dirty="0">
               <a:latin typeface="Arial" pitchFamily="34" charset="0"/>
@@ -14852,7 +13968,7 @@
         <p:spPr>
           <a:xfrm>
             <a:off x="251520" y="1177315"/>
-            <a:ext cx="8784976" cy="4662815"/>
+            <a:ext cx="8784976" cy="3816429"/>
           </a:xfrm>
           <a:prstGeom prst="rect">
             <a:avLst/>
@@ -14870,11 +13986,25 @@
               <a:buChar char="•"/>
             </a:pPr>
             <a:r>
+              <a:rPr lang="sk-SK" sz="1600" smtClean="0">
+                <a:latin typeface="Arial" pitchFamily="34" charset="0"/>
+                <a:cs typeface="Arial" pitchFamily="34" charset="0"/>
+              </a:rPr>
+              <a:t>  </a:t>
+            </a:r>
+            <a:r>
+              <a:rPr lang="sk-SK" sz="1600" smtClean="0">
+                <a:latin typeface="Arial" pitchFamily="34" charset="0"/>
+                <a:cs typeface="Arial" pitchFamily="34" charset="0"/>
+              </a:rPr>
+              <a:t>Optimalizovať </a:t>
+            </a:r>
+            <a:r>
               <a:rPr lang="sk-SK" sz="1600" dirty="0" smtClean="0">
                 <a:latin typeface="Arial" pitchFamily="34" charset="0"/>
                 <a:cs typeface="Arial" pitchFamily="34" charset="0"/>
               </a:rPr>
-              <a:t>  Optimalizovať už implementované funkcionality pre rýchlejšiu a príjemnejšiu prácu v editore</a:t>
+              <a:t>už implementované funkcionality pre rýchlejšiu a príjemnejšiu prácu v editore</a:t>
             </a:r>
           </a:p>
           <a:p>
@@ -14897,21 +14027,7 @@
                 <a:latin typeface="Arial" pitchFamily="34" charset="0"/>
                 <a:cs typeface="Arial" pitchFamily="34" charset="0"/>
               </a:rPr>
-              <a:t>  Vylepšiť analýzu zdrojového kódu pre rôzne jazyky (</a:t>
-            </a:r>
-            <a:r>
-              <a:rPr lang="sk-SK" sz="1600" dirty="0" err="1" smtClean="0">
-                <a:latin typeface="Arial" pitchFamily="34" charset="0"/>
-                <a:cs typeface="Arial" pitchFamily="34" charset="0"/>
-              </a:rPr>
-              <a:t>Java</a:t>
-            </a:r>
-            <a:r>
-              <a:rPr lang="sk-SK" sz="1600" dirty="0" smtClean="0">
-                <a:latin typeface="Arial" pitchFamily="34" charset="0"/>
-                <a:cs typeface="Arial" pitchFamily="34" charset="0"/>
-              </a:rPr>
-              <a:t>, C#, HTML, PHP a pod.)</a:t>
+              <a:t>  Vylepšiť analýzu zdrojového kódu pre rôzne jazyky (Java, C#, HTML, PHP a pod.)</a:t>
             </a:r>
           </a:p>
           <a:p>
@@ -14957,24 +14073,38 @@
                 <a:latin typeface="Arial" pitchFamily="34" charset="0"/>
                 <a:cs typeface="Arial" pitchFamily="34" charset="0"/>
               </a:rPr>
-              <a:t>  Rozšíriť vstavajúcu funkcionalitu editora (Vyhľadávanie, </a:t>
-            </a:r>
-            <a:r>
-              <a:rPr lang="sk-SK" sz="1600" dirty="0" err="1" smtClean="0">
-                <a:latin typeface="Arial" pitchFamily="34" charset="0"/>
-                <a:cs typeface="Arial" pitchFamily="34" charset="0"/>
-              </a:rPr>
-              <a:t>IntelliSense</a:t>
+              <a:t>  Rozšíriť </a:t>
             </a:r>
             <a:r>
               <a:rPr lang="sk-SK" sz="1600" dirty="0" smtClean="0">
                 <a:latin typeface="Arial" pitchFamily="34" charset="0"/>
                 <a:cs typeface="Arial" pitchFamily="34" charset="0"/>
               </a:rPr>
+              <a:t>vstávajúcu </a:t>
+            </a:r>
+            <a:r>
+              <a:rPr lang="sk-SK" sz="1600" dirty="0" smtClean="0">
+                <a:latin typeface="Arial" pitchFamily="34" charset="0"/>
+                <a:cs typeface="Arial" pitchFamily="34" charset="0"/>
+              </a:rPr>
+              <a:t>funkcionalitu editora (Vyhľadávanie, </a:t>
+            </a:r>
+            <a:r>
+              <a:rPr lang="sk-SK" sz="1600" dirty="0" smtClean="0">
+                <a:latin typeface="Arial" pitchFamily="34" charset="0"/>
+                <a:cs typeface="Arial" pitchFamily="34" charset="0"/>
+              </a:rPr>
+              <a:t>IntelliSense</a:t>
+            </a:r>
+            <a:r>
+              <a:rPr lang="sk-SK" sz="1600" dirty="0" smtClean="0">
+                <a:latin typeface="Arial" pitchFamily="34" charset="0"/>
+                <a:cs typeface="Arial" pitchFamily="34" charset="0"/>
+              </a:rPr>
               <a:t>, </a:t>
             </a:r>
             <a:r>
-              <a:rPr lang="sk-SK" sz="1600" dirty="0" err="1" smtClean="0">
+              <a:rPr lang="sk-SK" sz="1600" dirty="0" smtClean="0">
                 <a:latin typeface="Arial" pitchFamily="34" charset="0"/>
                 <a:cs typeface="Arial" pitchFamily="34" charset="0"/>
               </a:rPr>
@@ -15016,16 +14146,6 @@
               <a:buFont typeface="Arial" pitchFamily="34" charset="0"/>
               <a:buChar char="•"/>
             </a:pPr>
-            <a:endParaRPr lang="sk-SK" sz="1100" dirty="0" smtClean="0">
-              <a:latin typeface="Arial" pitchFamily="34" charset="0"/>
-              <a:cs typeface="Arial" pitchFamily="34" charset="0"/>
-            </a:endParaRPr>
-          </a:p>
-          <a:p>
-            <a:pPr>
-              <a:buFont typeface="Arial" pitchFamily="34" charset="0"/>
-              <a:buChar char="•"/>
-            </a:pPr>
             <a:endParaRPr lang="sk-SK" sz="2000" dirty="0" smtClean="0">
               <a:latin typeface="Arial" pitchFamily="34" charset="0"/>
               <a:cs typeface="Arial" pitchFamily="34" charset="0"/>
@@ -15059,28 +14179,6 @@
               <a:buChar char="•"/>
             </a:pPr>
             <a:endParaRPr lang="sk-SK" sz="1600" dirty="0" smtClean="0">
-              <a:latin typeface="Arial" pitchFamily="34" charset="0"/>
-              <a:cs typeface="Arial" pitchFamily="34" charset="0"/>
-            </a:endParaRPr>
-          </a:p>
-          <a:p>
-            <a:pPr>
-              <a:buFont typeface="Arial" pitchFamily="34" charset="0"/>
-              <a:buChar char="•"/>
-            </a:pPr>
-            <a:endParaRPr lang="sk-SK" sz="1600" dirty="0" smtClean="0">
-              <a:latin typeface="Arial" pitchFamily="34" charset="0"/>
-              <a:cs typeface="Arial" pitchFamily="34" charset="0"/>
-            </a:endParaRPr>
-          </a:p>
-          <a:p>
-            <a:endParaRPr lang="sk-SK" sz="1400" dirty="0" smtClean="0">
-              <a:latin typeface="Arial" pitchFamily="34" charset="0"/>
-              <a:cs typeface="Arial" pitchFamily="34" charset="0"/>
-            </a:endParaRPr>
-          </a:p>
-          <a:p>
-            <a:endParaRPr lang="sk-SK" sz="1400" dirty="0" smtClean="0">
               <a:latin typeface="Arial" pitchFamily="34" charset="0"/>
               <a:cs typeface="Arial" pitchFamily="34" charset="0"/>
             </a:endParaRPr>
@@ -15430,7 +14528,7 @@
               <a:t>(dočasné, možno bude .</a:t>
             </a:r>
             <a:r>
-              <a:rPr lang="sk-SK" sz="1400" dirty="0" err="1" smtClean="0">
+              <a:rPr lang="sk-SK" sz="1400" dirty="0" smtClean="0">
                 <a:latin typeface="Arial" pitchFamily="34" charset="0"/>
                 <a:cs typeface="Arial" pitchFamily="34" charset="0"/>
               </a:rPr>

</xml_diff>

<commit_message>
[+] pridanie loga editora
(vymena loga v prezentacii)
</commit_message>
<xml_diff>
--- a/Dokumentacie/Ostatne/Prezentacie/LS/TrollEdit.pptx
+++ b/Dokumentacie/Ostatne/Prezentacie/LS/TrollEdit.pptx
@@ -203,7 +203,7 @@
             <a:fld id="{417BABF7-0521-4687-9D2B-807B4AABA4E6}" type="datetimeFigureOut">
               <a:rPr lang="sk-SK" smtClean="0"/>
               <a:pPr/>
-              <a:t>4. 3. 2012</a:t>
+              <a:t>5. 3. 2012</a:t>
             </a:fld>
             <a:endParaRPr lang="sk-SK" dirty="0"/>
           </a:p>
@@ -2868,7 +2868,7 @@
             <a:fld id="{10336B07-8511-4DF2-93E1-5665CA9277ED}" type="datetimeFigureOut">
               <a:rPr lang="sk-SK" smtClean="0"/>
               <a:pPr/>
-              <a:t>4. 3. 2012</a:t>
+              <a:t>5. 3. 2012</a:t>
             </a:fld>
             <a:endParaRPr lang="sk-SK" dirty="0"/>
           </a:p>
@@ -3035,7 +3035,7 @@
             <a:fld id="{10336B07-8511-4DF2-93E1-5665CA9277ED}" type="datetimeFigureOut">
               <a:rPr lang="sk-SK" smtClean="0"/>
               <a:pPr/>
-              <a:t>4. 3. 2012</a:t>
+              <a:t>5. 3. 2012</a:t>
             </a:fld>
             <a:endParaRPr lang="sk-SK" dirty="0"/>
           </a:p>
@@ -3212,7 +3212,7 @@
             <a:fld id="{10336B07-8511-4DF2-93E1-5665CA9277ED}" type="datetimeFigureOut">
               <a:rPr lang="sk-SK" smtClean="0"/>
               <a:pPr/>
-              <a:t>4. 3. 2012</a:t>
+              <a:t>5. 3. 2012</a:t>
             </a:fld>
             <a:endParaRPr lang="sk-SK" dirty="0"/>
           </a:p>
@@ -3457,7 +3457,7 @@
                 </a:solidFill>
               </a:rPr>
               <a:pPr/>
-              <a:t>4. 3. 2012</a:t>
+              <a:t>5. 3. 2012</a:t>
             </a:fld>
             <a:endParaRPr lang="sk-SK" dirty="0">
               <a:solidFill>
@@ -3654,7 +3654,7 @@
                 </a:solidFill>
               </a:rPr>
               <a:pPr/>
-              <a:t>4. 3. 2012</a:t>
+              <a:t>5. 3. 2012</a:t>
             </a:fld>
             <a:endParaRPr lang="sk-SK" dirty="0">
               <a:solidFill>
@@ -3927,7 +3927,7 @@
                 </a:solidFill>
               </a:rPr>
               <a:pPr/>
-              <a:t>4. 3. 2012</a:t>
+              <a:t>5. 3. 2012</a:t>
             </a:fld>
             <a:endParaRPr lang="sk-SK" dirty="0">
               <a:solidFill>
@@ -4242,7 +4242,7 @@
                 </a:solidFill>
               </a:rPr>
               <a:pPr/>
-              <a:t>4. 3. 2012</a:t>
+              <a:t>5. 3. 2012</a:t>
             </a:fld>
             <a:endParaRPr lang="sk-SK" dirty="0">
               <a:solidFill>
@@ -4691,7 +4691,7 @@
                 </a:solidFill>
               </a:rPr>
               <a:pPr/>
-              <a:t>4. 3. 2012</a:t>
+              <a:t>5. 3. 2012</a:t>
             </a:fld>
             <a:endParaRPr lang="sk-SK" dirty="0">
               <a:solidFill>
@@ -4836,7 +4836,7 @@
                 </a:solidFill>
               </a:rPr>
               <a:pPr/>
-              <a:t>4. 3. 2012</a:t>
+              <a:t>5. 3. 2012</a:t>
             </a:fld>
             <a:endParaRPr lang="sk-SK" dirty="0">
               <a:solidFill>
@@ -4958,7 +4958,7 @@
                 </a:solidFill>
               </a:rPr>
               <a:pPr/>
-              <a:t>4. 3. 2012</a:t>
+              <a:t>5. 3. 2012</a:t>
             </a:fld>
             <a:endParaRPr lang="sk-SK" dirty="0">
               <a:solidFill>
@@ -5262,7 +5262,7 @@
                 </a:solidFill>
               </a:rPr>
               <a:pPr/>
-              <a:t>4. 3. 2012</a:t>
+              <a:t>5. 3. 2012</a:t>
             </a:fld>
             <a:endParaRPr lang="sk-SK" dirty="0">
               <a:solidFill>
@@ -5453,7 +5453,7 @@
             <a:fld id="{10336B07-8511-4DF2-93E1-5665CA9277ED}" type="datetimeFigureOut">
               <a:rPr lang="sk-SK" smtClean="0"/>
               <a:pPr/>
-              <a:t>4. 3. 2012</a:t>
+              <a:t>5. 3. 2012</a:t>
             </a:fld>
             <a:endParaRPr lang="sk-SK" dirty="0"/>
           </a:p>
@@ -5709,7 +5709,7 @@
                 </a:solidFill>
               </a:rPr>
               <a:pPr/>
-              <a:t>4. 3. 2012</a:t>
+              <a:t>5. 3. 2012</a:t>
             </a:fld>
             <a:endParaRPr lang="sk-SK" dirty="0">
               <a:solidFill>
@@ -5906,7 +5906,7 @@
                 </a:solidFill>
               </a:rPr>
               <a:pPr/>
-              <a:t>4. 3. 2012</a:t>
+              <a:t>5. 3. 2012</a:t>
             </a:fld>
             <a:endParaRPr lang="sk-SK" dirty="0">
               <a:solidFill>
@@ -6113,7 +6113,7 @@
                 </a:solidFill>
               </a:rPr>
               <a:pPr/>
-              <a:t>4. 3. 2012</a:t>
+              <a:t>5. 3. 2012</a:t>
             </a:fld>
             <a:endParaRPr lang="sk-SK" dirty="0">
               <a:solidFill>
@@ -6380,7 +6380,7 @@
             <a:fld id="{10336B07-8511-4DF2-93E1-5665CA9277ED}" type="datetimeFigureOut">
               <a:rPr lang="sk-SK" smtClean="0"/>
               <a:pPr/>
-              <a:t>4. 3. 2012</a:t>
+              <a:t>5. 3. 2012</a:t>
             </a:fld>
             <a:endParaRPr lang="sk-SK" dirty="0"/>
           </a:p>
@@ -6665,7 +6665,7 @@
             <a:fld id="{10336B07-8511-4DF2-93E1-5665CA9277ED}" type="datetimeFigureOut">
               <a:rPr lang="sk-SK" smtClean="0"/>
               <a:pPr/>
-              <a:t>4. 3. 2012</a:t>
+              <a:t>5. 3. 2012</a:t>
             </a:fld>
             <a:endParaRPr lang="sk-SK" dirty="0"/>
           </a:p>
@@ -7089,7 +7089,7 @@
             <a:fld id="{10336B07-8511-4DF2-93E1-5665CA9277ED}" type="datetimeFigureOut">
               <a:rPr lang="sk-SK" smtClean="0"/>
               <a:pPr/>
-              <a:t>4. 3. 2012</a:t>
+              <a:t>5. 3. 2012</a:t>
             </a:fld>
             <a:endParaRPr lang="sk-SK" dirty="0"/>
           </a:p>
@@ -7204,7 +7204,7 @@
             <a:fld id="{10336B07-8511-4DF2-93E1-5665CA9277ED}" type="datetimeFigureOut">
               <a:rPr lang="sk-SK" smtClean="0"/>
               <a:pPr/>
-              <a:t>4. 3. 2012</a:t>
+              <a:t>5. 3. 2012</a:t>
             </a:fld>
             <a:endParaRPr lang="sk-SK" dirty="0"/>
           </a:p>
@@ -7296,7 +7296,7 @@
             <a:fld id="{10336B07-8511-4DF2-93E1-5665CA9277ED}" type="datetimeFigureOut">
               <a:rPr lang="sk-SK" smtClean="0"/>
               <a:pPr/>
-              <a:t>4. 3. 2012</a:t>
+              <a:t>5. 3. 2012</a:t>
             </a:fld>
             <a:endParaRPr lang="sk-SK" dirty="0"/>
           </a:p>
@@ -7570,7 +7570,7 @@
             <a:fld id="{10336B07-8511-4DF2-93E1-5665CA9277ED}" type="datetimeFigureOut">
               <a:rPr lang="sk-SK" smtClean="0"/>
               <a:pPr/>
-              <a:t>4. 3. 2012</a:t>
+              <a:t>5. 3. 2012</a:t>
             </a:fld>
             <a:endParaRPr lang="sk-SK" dirty="0"/>
           </a:p>
@@ -7820,7 +7820,7 @@
             <a:fld id="{10336B07-8511-4DF2-93E1-5665CA9277ED}" type="datetimeFigureOut">
               <a:rPr lang="sk-SK" smtClean="0"/>
               <a:pPr/>
-              <a:t>4. 3. 2012</a:t>
+              <a:t>5. 3. 2012</a:t>
             </a:fld>
             <a:endParaRPr lang="sk-SK" dirty="0"/>
           </a:p>
@@ -8030,7 +8030,7 @@
             <a:fld id="{10336B07-8511-4DF2-93E1-5665CA9277ED}" type="datetimeFigureOut">
               <a:rPr lang="sk-SK" smtClean="0"/>
               <a:pPr/>
-              <a:t>4. 3. 2012</a:t>
+              <a:t>5. 3. 2012</a:t>
             </a:fld>
             <a:endParaRPr lang="sk-SK" dirty="0"/>
           </a:p>
@@ -8566,7 +8566,7 @@
                 </a:solidFill>
               </a:rPr>
               <a:pPr/>
-              <a:t>4. 3. 2012</a:t>
+              <a:t>5. 3. 2012</a:t>
             </a:fld>
             <a:endParaRPr lang="sk-SK" dirty="0">
               <a:solidFill>
@@ -9179,27 +9179,27 @@
       </p:sp>
       <p:grpSp>
         <p:nvGrpSpPr>
-          <p:cNvPr id="19" name="Skupina 18"/>
+          <p:cNvPr id="12" name="Skupina 11"/>
           <p:cNvGrpSpPr/>
           <p:nvPr/>
         </p:nvGrpSpPr>
         <p:grpSpPr>
           <a:xfrm>
-            <a:off x="4067944" y="3433564"/>
-            <a:ext cx="4797681" cy="1446550"/>
-            <a:chOff x="2971800" y="3028950"/>
-            <a:chExt cx="4797681" cy="1446550"/>
+            <a:off x="3995936" y="3361556"/>
+            <a:ext cx="4972943" cy="1447800"/>
+            <a:chOff x="304800" y="2495550"/>
+            <a:chExt cx="4972943" cy="1447800"/>
           </a:xfrm>
         </p:grpSpPr>
         <p:sp>
           <p:nvSpPr>
-            <p:cNvPr id="20" name="BlokTextu 19"/>
+            <p:cNvPr id="13" name="BlokTextu 12"/>
             <p:cNvSpPr txBox="1"/>
             <p:nvPr/>
           </p:nvSpPr>
           <p:spPr>
             <a:xfrm>
-              <a:off x="3048000" y="3028950"/>
+              <a:off x="381000" y="2495550"/>
               <a:ext cx="4038600" cy="1446550"/>
             </a:xfrm>
             <a:prstGeom prst="rect">
@@ -9248,12 +9248,12 @@
                 <a:t>roll</a:t>
               </a:r>
               <a:r>
-                <a:rPr lang="sk-SK" sz="7600" spc="-300" dirty="0" smtClean="0">
+                <a:rPr lang="sk-SK" sz="7500" spc="-300" dirty="0" smtClean="0">
                   <a:solidFill>
                     <a:srgbClr val="972C29"/>
                   </a:solidFill>
                   <a:effectLst>
-                    <a:outerShdw blurRad="50800" dist="38100" dir="18900000" algn="bl" rotWithShape="0">
+                    <a:outerShdw blurRad="50800" dist="38100" dir="5400000" algn="t" rotWithShape="0">
                       <a:prstClr val="black">
                         <a:alpha val="40000"/>
                       </a:prstClr>
@@ -9280,13 +9280,13 @@
         </p:sp>
         <p:sp>
           <p:nvSpPr>
-            <p:cNvPr id="21" name="BlokTextu 20"/>
+            <p:cNvPr id="15" name="BlokTextu 14"/>
             <p:cNvSpPr txBox="1"/>
             <p:nvPr/>
           </p:nvSpPr>
           <p:spPr>
             <a:xfrm>
-              <a:off x="4038600" y="4171950"/>
+              <a:off x="1371600" y="3638550"/>
               <a:ext cx="3048000" cy="233619"/>
             </a:xfrm>
             <a:prstGeom prst="rect">
@@ -9313,22 +9313,22 @@
                     </a:outerShdw>
                   </a:effectLst>
                 </a:rPr>
-                <a:t>                </a:t>
+                <a:t>               </a:t>
               </a:r>
               <a:r>
                 <a:rPr lang="en-US" sz="1050" dirty="0" smtClean="0">
                   <a:solidFill>
                     <a:schemeClr val="tx1">
-                      <a:lumMod val="85000"/>
-                      <a:lumOff val="15000"/>
+                      <a:lumMod val="75000"/>
+                      <a:lumOff val="25000"/>
                     </a:schemeClr>
                   </a:solidFill>
                   <a:effectLst>
-                    <a:outerShdw blurRad="50800" dist="38100" dir="16200000" rotWithShape="0">
+                    <a:innerShdw blurRad="63500" dist="50800" dir="5400000">
                       <a:prstClr val="black">
-                        <a:alpha val="40000"/>
+                        <a:alpha val="50000"/>
                       </a:prstClr>
-                    </a:outerShdw>
+                    </a:innerShdw>
                   </a:effectLst>
                 </a:rPr>
                 <a:t>text editor with graphical enhancements</a:t>
@@ -9336,16 +9336,16 @@
               <a:endParaRPr lang="sk-SK" sz="1100" dirty="0">
                 <a:solidFill>
                   <a:schemeClr val="tx1">
-                    <a:lumMod val="85000"/>
-                    <a:lumOff val="15000"/>
+                    <a:lumMod val="75000"/>
+                    <a:lumOff val="25000"/>
                   </a:schemeClr>
                 </a:solidFill>
                 <a:effectLst>
-                  <a:outerShdw blurRad="50800" dist="38100" dir="16200000" rotWithShape="0">
+                  <a:innerShdw blurRad="63500" dist="50800" dir="5400000">
                     <a:prstClr val="black">
-                      <a:alpha val="40000"/>
+                      <a:alpha val="50000"/>
                     </a:prstClr>
-                  </a:outerShdw>
+                  </a:innerShdw>
                 </a:effectLst>
               </a:endParaRPr>
             </a:p>
@@ -9353,18 +9353,36 @@
         </p:sp>
         <p:sp>
           <p:nvSpPr>
-            <p:cNvPr id="22" name="Polovičný rám 21"/>
+            <p:cNvPr id="17" name="Mesiac 16"/>
             <p:cNvSpPr/>
             <p:nvPr/>
           </p:nvSpPr>
           <p:spPr>
-            <a:xfrm rot="9826324">
-              <a:off x="7206267" y="3656613"/>
-              <a:ext cx="563214" cy="649674"/>
+            <a:xfrm rot="10800000">
+              <a:off x="3657600" y="2647950"/>
+              <a:ext cx="1452810" cy="1295400"/>
             </a:xfrm>
-            <a:prstGeom prst="halfFrame">
-              <a:avLst/>
+            <a:prstGeom prst="moon">
+              <a:avLst>
+                <a:gd name="adj" fmla="val 24071"/>
+              </a:avLst>
             </a:prstGeom>
+            <a:gradFill>
+              <a:gsLst>
+                <a:gs pos="0">
+                  <a:schemeClr val="accent2">
+                    <a:shade val="51000"/>
+                    <a:satMod val="130000"/>
+                  </a:schemeClr>
+                </a:gs>
+                <a:gs pos="80000">
+                  <a:srgbClr val="972C29"/>
+                </a:gs>
+                <a:gs pos="100000">
+                  <a:srgbClr val="C00000"/>
+                </a:gs>
+              </a:gsLst>
+            </a:gradFill>
             <a:effectLst>
               <a:outerShdw blurRad="76200" dir="13500000" sy="23000" kx="1200000" algn="br" rotWithShape="0">
                 <a:prstClr val="black">
@@ -9392,7 +9410,7 @@
             <a:lstStyle/>
             <a:p>
               <a:pPr algn="ctr"/>
-              <a:endParaRPr lang="sk-SK" dirty="0">
+              <a:endParaRPr lang="sk-SK">
                 <a:ln w="18415" cmpd="sng">
                   <a:solidFill>
                     <a:srgbClr val="FFFFFF"/>
@@ -9415,21 +9433,24 @@
         </p:sp>
         <p:cxnSp>
           <p:nvCxnSpPr>
-            <p:cNvPr id="23" name="Rovná spojnica 22"/>
+            <p:cNvPr id="18" name="Rovná spojnica 17"/>
             <p:cNvCxnSpPr/>
             <p:nvPr/>
           </p:nvCxnSpPr>
           <p:spPr>
             <a:xfrm>
-              <a:off x="4572000" y="4171950"/>
-              <a:ext cx="2286000" cy="0"/>
+              <a:off x="1752600" y="3638550"/>
+              <a:ext cx="2438400" cy="0"/>
             </a:xfrm>
             <a:prstGeom prst="line">
               <a:avLst/>
             </a:prstGeom>
             <a:ln w="3175">
               <a:solidFill>
-                <a:srgbClr val="C00000"/>
+                <a:schemeClr val="tx1">
+                  <a:lumMod val="95000"/>
+                  <a:lumOff val="5000"/>
+                </a:schemeClr>
               </a:solidFill>
               <a:headEnd type="none" w="med" len="med"/>
               <a:tailEnd type="none" w="med" len="med"/>
@@ -9450,23 +9471,80 @@
             </a:fontRef>
           </p:style>
         </p:cxnSp>
+        <p:pic>
+          <p:nvPicPr>
+            <p:cNvPr id="26" name="Picture 4"/>
+            <p:cNvPicPr>
+              <a:picLocks noChangeAspect="1" noChangeArrowheads="1"/>
+            </p:cNvPicPr>
+            <p:nvPr/>
+          </p:nvPicPr>
+          <p:blipFill>
+            <a:blip r:embed="rId3" cstate="print"/>
+            <a:srcRect/>
+            <a:stretch>
+              <a:fillRect/>
+            </a:stretch>
+          </p:blipFill>
+          <p:spPr bwMode="auto">
+            <a:xfrm>
+              <a:off x="304800" y="2647950"/>
+              <a:ext cx="1066800" cy="1066800"/>
+            </a:xfrm>
+            <a:prstGeom prst="rect">
+              <a:avLst/>
+            </a:prstGeom>
+            <a:noFill/>
+            <a:ln w="9525">
+              <a:noFill/>
+              <a:miter lim="800000"/>
+              <a:headEnd/>
+              <a:tailEnd/>
+            </a:ln>
+            <a:effectLst>
+              <a:outerShdw blurRad="50800" dist="38100" dir="2700000" algn="tl" rotWithShape="0">
+                <a:prstClr val="black">
+                  <a:alpha val="40000"/>
+                </a:prstClr>
+              </a:outerShdw>
+            </a:effectLst>
+          </p:spPr>
+        </p:pic>
         <p:sp>
           <p:nvSpPr>
-            <p:cNvPr id="24" name="Polovičný rám 23"/>
+            <p:cNvPr id="27" name="Mesiac 26"/>
             <p:cNvSpPr/>
             <p:nvPr/>
           </p:nvSpPr>
           <p:spPr>
-            <a:xfrm rot="20797791">
-              <a:off x="7112524" y="3655825"/>
-              <a:ext cx="597500" cy="633010"/>
+            <a:xfrm rot="10984194">
+              <a:off x="4896742" y="2962411"/>
+              <a:ext cx="381001" cy="754930"/>
             </a:xfrm>
-            <a:prstGeom prst="halfFrame">
-              <a:avLst/>
+            <a:prstGeom prst="moon">
+              <a:avLst>
+                <a:gd name="adj" fmla="val 21657"/>
+              </a:avLst>
             </a:prstGeom>
-            <a:solidFill>
-              <a:srgbClr val="972C29"/>
-            </a:solidFill>
+            <a:gradFill>
+              <a:gsLst>
+                <a:gs pos="0">
+                  <a:schemeClr val="accent2">
+                    <a:shade val="51000"/>
+                    <a:satMod val="130000"/>
+                  </a:schemeClr>
+                </a:gs>
+                <a:gs pos="80000">
+                  <a:srgbClr val="972C29"/>
+                </a:gs>
+                <a:gs pos="100000">
+                  <a:srgbClr val="C00000"/>
+                </a:gs>
+              </a:gsLst>
+            </a:gradFill>
+            <a:ln>
+              <a:noFill/>
+            </a:ln>
             <a:effectLst>
               <a:outerShdw blurRad="76200" dir="13500000" sy="23000" kx="1200000" algn="br" rotWithShape="0">
                 <a:prstClr val="black">
@@ -9494,7 +9572,7 @@
             <a:lstStyle/>
             <a:p>
               <a:pPr algn="ctr"/>
-              <a:endParaRPr lang="sk-SK" dirty="0">
+              <a:endParaRPr lang="sk-SK">
                 <a:ln w="18415" cmpd="sng">
                   <a:solidFill>
                     <a:srgbClr val="FFFFFF"/>
@@ -9515,45 +9593,6 @@
             </a:p>
           </p:txBody>
         </p:sp>
-        <p:pic>
-          <p:nvPicPr>
-            <p:cNvPr id="25" name="Picture 4"/>
-            <p:cNvPicPr>
-              <a:picLocks noChangeAspect="1" noChangeArrowheads="1"/>
-            </p:cNvPicPr>
-            <p:nvPr/>
-          </p:nvPicPr>
-          <p:blipFill>
-            <a:blip r:embed="rId3" cstate="print"/>
-            <a:srcRect/>
-            <a:stretch>
-              <a:fillRect/>
-            </a:stretch>
-          </p:blipFill>
-          <p:spPr bwMode="auto">
-            <a:xfrm>
-              <a:off x="2971800" y="3181350"/>
-              <a:ext cx="1066800" cy="990600"/>
-            </a:xfrm>
-            <a:prstGeom prst="rect">
-              <a:avLst/>
-            </a:prstGeom>
-            <a:noFill/>
-            <a:ln w="9525">
-              <a:noFill/>
-              <a:miter lim="800000"/>
-              <a:headEnd/>
-              <a:tailEnd/>
-            </a:ln>
-            <a:effectLst>
-              <a:outerShdw blurRad="50800" dist="38100" dir="2700000" algn="tl" rotWithShape="0">
-                <a:prstClr val="black">
-                  <a:alpha val="40000"/>
-                </a:prstClr>
-              </a:outerShdw>
-            </a:effectLst>
-          </p:spPr>
-        </p:pic>
       </p:grpSp>
     </p:spTree>
   </p:cSld>
@@ -9592,7 +9631,7 @@
       </p:grpSpPr>
       <p:pic>
         <p:nvPicPr>
-          <p:cNvPr id="3" name="Obrázok 2" descr="Obrázok1.png"/>
+          <p:cNvPr id="4" name="Obrázok 3" descr="TrollEdit_logo.png"/>
           <p:cNvPicPr>
             <a:picLocks noChangeAspect="1"/>
           </p:cNvPicPr>
@@ -9606,8 +9645,8 @@
         </p:blipFill>
         <p:spPr>
           <a:xfrm>
-            <a:off x="3635896" y="4153644"/>
-            <a:ext cx="2546780" cy="978566"/>
+            <a:off x="3203848" y="4153644"/>
+            <a:ext cx="2871871" cy="1137582"/>
           </a:xfrm>
           <a:prstGeom prst="rect">
             <a:avLst/>
@@ -10046,7 +10085,7 @@
         </p:blipFill>
         <p:spPr>
           <a:xfrm>
-            <a:off x="2699792" y="1657367"/>
+            <a:off x="2699792" y="1129308"/>
             <a:ext cx="3620972" cy="880098"/>
           </a:xfrm>
           <a:prstGeom prst="rect">
@@ -11117,79 +11156,33 @@
                 <a:latin typeface="Arial" pitchFamily="34" charset="0"/>
                 <a:cs typeface="Arial" pitchFamily="34" charset="0"/>
               </a:rPr>
-              <a:t>literate</a:t>
-            </a:r>
+              <a:t>literate programming </a:t>
+            </a:r>
+            <a:r>
+              <a:rPr lang="sk-SK" sz="1600" dirty="0" smtClean="0">
+                <a:latin typeface="Arial" pitchFamily="34" charset="0"/>
+                <a:cs typeface="Arial" pitchFamily="34" charset="0"/>
+              </a:rPr>
+              <a:t>pána </a:t>
+            </a:r>
+          </a:p>
+          <a:p>
             <a:r>
               <a:rPr lang="sk-SK" sz="1600" i="1" dirty="0" smtClean="0">
                 <a:latin typeface="Arial" pitchFamily="34" charset="0"/>
                 <a:cs typeface="Arial" pitchFamily="34" charset="0"/>
               </a:rPr>
-              <a:t> </a:t>
-            </a:r>
+              <a:t>      </a:t>
+            </a:r>
+          </a:p>
+          <a:p>
             <a:r>
               <a:rPr lang="sk-SK" sz="1600" i="1" dirty="0" smtClean="0">
                 <a:latin typeface="Arial" pitchFamily="34" charset="0"/>
                 <a:cs typeface="Arial" pitchFamily="34" charset="0"/>
               </a:rPr>
-              <a:t>programming</a:t>
-            </a:r>
-            <a:r>
-              <a:rPr lang="sk-SK" sz="1600" i="1" dirty="0" smtClean="0">
-                <a:latin typeface="Arial" pitchFamily="34" charset="0"/>
-                <a:cs typeface="Arial" pitchFamily="34" charset="0"/>
-              </a:rPr>
-              <a:t> </a:t>
-            </a:r>
-            <a:r>
-              <a:rPr lang="sk-SK" sz="1600" dirty="0" smtClean="0">
-                <a:latin typeface="Arial" pitchFamily="34" charset="0"/>
-                <a:cs typeface="Arial" pitchFamily="34" charset="0"/>
-              </a:rPr>
-              <a:t>pána </a:t>
-            </a:r>
-          </a:p>
-          <a:p>
-            <a:r>
-              <a:rPr lang="sk-SK" sz="1600" i="1" dirty="0" smtClean="0">
-                <a:latin typeface="Arial" pitchFamily="34" charset="0"/>
-                <a:cs typeface="Arial" pitchFamily="34" charset="0"/>
-              </a:rPr>
-              <a:t>      </a:t>
-            </a:r>
-          </a:p>
-          <a:p>
-            <a:r>
-              <a:rPr lang="sk-SK" sz="1600" i="1" dirty="0" smtClean="0">
-                <a:latin typeface="Arial" pitchFamily="34" charset="0"/>
-                <a:cs typeface="Arial" pitchFamily="34" charset="0"/>
-              </a:rPr>
-              <a:t>                                                                                                                    </a:t>
-            </a:r>
-            <a:r>
-              <a:rPr lang="sk-SK" sz="1600" i="1" dirty="0" smtClean="0">
-                <a:latin typeface="Arial" pitchFamily="34" charset="0"/>
-                <a:cs typeface="Arial" pitchFamily="34" charset="0"/>
-              </a:rPr>
-              <a:t>Donalda</a:t>
-            </a:r>
-            <a:r>
-              <a:rPr lang="sk-SK" sz="1600" i="1" dirty="0" smtClean="0">
-                <a:latin typeface="Arial" pitchFamily="34" charset="0"/>
-                <a:cs typeface="Arial" pitchFamily="34" charset="0"/>
-              </a:rPr>
-              <a:t> </a:t>
-            </a:r>
-            <a:r>
-              <a:rPr lang="sk-SK" sz="1600" i="1" dirty="0" smtClean="0">
-                <a:latin typeface="Arial" pitchFamily="34" charset="0"/>
-                <a:cs typeface="Arial" pitchFamily="34" charset="0"/>
-              </a:rPr>
-              <a:t>Knutha</a:t>
-            </a:r>
-            <a:endParaRPr lang="sk-SK" sz="1600" i="1" dirty="0" smtClean="0">
-              <a:latin typeface="Arial" pitchFamily="34" charset="0"/>
-              <a:cs typeface="Arial" pitchFamily="34" charset="0"/>
-            </a:endParaRPr>
+              <a:t>                                                                                                                    Donalda Knutha</a:t>
+            </a:r>
           </a:p>
           <a:p>
             <a:endParaRPr lang="sk-SK" sz="1400" dirty="0" smtClean="0">
@@ -11448,21 +11441,7 @@
                 <a:latin typeface="Arial" pitchFamily="34" charset="0"/>
                 <a:cs typeface="Arial" pitchFamily="34" charset="0"/>
               </a:rPr>
-              <a:t>                                            </a:t>
-            </a:r>
-            <a:r>
-              <a:rPr lang="sk-SK" sz="2400" b="1" dirty="0" smtClean="0">
-                <a:latin typeface="Arial" pitchFamily="34" charset="0"/>
-                <a:cs typeface="Arial" pitchFamily="34" charset="0"/>
-              </a:rPr>
-              <a:t>Použité </a:t>
-            </a:r>
-            <a:r>
-              <a:rPr lang="sk-SK" sz="2400" b="1" dirty="0" smtClean="0">
-                <a:latin typeface="Arial" pitchFamily="34" charset="0"/>
-                <a:cs typeface="Arial" pitchFamily="34" charset="0"/>
-              </a:rPr>
-              <a:t>technológie </a:t>
+              <a:t>                                            Použité technológie </a:t>
             </a:r>
             <a:endParaRPr lang="sk-SK" sz="2400" b="1" dirty="0">
               <a:latin typeface="Arial" pitchFamily="34" charset="0"/>
@@ -13201,74 +13180,25 @@
                 <a:latin typeface="Arial" pitchFamily="34" charset="0"/>
                 <a:cs typeface="Arial" pitchFamily="34" charset="0"/>
               </a:rPr>
-              <a:t>Abstract</a:t>
-            </a:r>
+              <a:t>Abstract Syntax Tree – stromová reprezentácia štruktúry zdrojového kódu</a:t>
+            </a:r>
+          </a:p>
+          <a:p>
             <a:r>
               <a:rPr lang="sk-SK" sz="1400" dirty="0" smtClean="0">
                 <a:latin typeface="Arial" pitchFamily="34" charset="0"/>
                 <a:cs typeface="Arial" pitchFamily="34" charset="0"/>
               </a:rPr>
-              <a:t> Syntax </a:t>
-            </a:r>
+              <a:t>Abstraktný = neviaže sa na konkrétny programovací jazyk</a:t>
+            </a:r>
+          </a:p>
+          <a:p>
             <a:r>
               <a:rPr lang="sk-SK" sz="1400" dirty="0" smtClean="0">
                 <a:latin typeface="Arial" pitchFamily="34" charset="0"/>
                 <a:cs typeface="Arial" pitchFamily="34" charset="0"/>
               </a:rPr>
-              <a:t>Tree</a:t>
-            </a:r>
-            <a:r>
-              <a:rPr lang="sk-SK" sz="1400" dirty="0" smtClean="0">
-                <a:latin typeface="Arial" pitchFamily="34" charset="0"/>
-                <a:cs typeface="Arial" pitchFamily="34" charset="0"/>
-              </a:rPr>
-              <a:t> – stromová reprezentácia štruktúry zdrojového kódu</a:t>
-            </a:r>
-          </a:p>
-          <a:p>
-            <a:r>
-              <a:rPr lang="sk-SK" sz="1400" dirty="0" smtClean="0">
-                <a:latin typeface="Arial" pitchFamily="34" charset="0"/>
-                <a:cs typeface="Arial" pitchFamily="34" charset="0"/>
-              </a:rPr>
-              <a:t>Abstraktný = neviaže sa na konkrétny programovací jazyk</a:t>
-            </a:r>
-          </a:p>
-          <a:p>
-            <a:r>
-              <a:rPr lang="sk-SK" sz="1400" dirty="0" smtClean="0">
-                <a:latin typeface="Arial" pitchFamily="34" charset="0"/>
-                <a:cs typeface="Arial" pitchFamily="34" charset="0"/>
-              </a:rPr>
-              <a:t>//  </a:t>
-            </a:r>
-            <a:r>
-              <a:rPr lang="sk-SK" sz="1400" dirty="0" smtClean="0">
-                <a:latin typeface="Arial" pitchFamily="34" charset="0"/>
-                <a:cs typeface="Arial" pitchFamily="34" charset="0"/>
-              </a:rPr>
-              <a:t>popisat</a:t>
-            </a:r>
-            <a:r>
-              <a:rPr lang="sk-SK" sz="1400" dirty="0" smtClean="0">
-                <a:latin typeface="Arial" pitchFamily="34" charset="0"/>
-                <a:cs typeface="Arial" pitchFamily="34" charset="0"/>
-              </a:rPr>
-              <a:t> ako pracuje editor ako sa </a:t>
-            </a:r>
-            <a:r>
-              <a:rPr lang="sk-SK" sz="1400" dirty="0" smtClean="0">
-                <a:latin typeface="Arial" pitchFamily="34" charset="0"/>
-                <a:cs typeface="Arial" pitchFamily="34" charset="0"/>
-              </a:rPr>
-              <a:t>vytvara</a:t>
-            </a:r>
-            <a:r>
-              <a:rPr lang="sk-SK" sz="1400" dirty="0" smtClean="0">
-                <a:latin typeface="Arial" pitchFamily="34" charset="0"/>
-                <a:cs typeface="Arial" pitchFamily="34" charset="0"/>
-              </a:rPr>
-              <a:t>  AST strom a podobne  </a:t>
+              <a:t>//  popisat ako pracuje editor ako sa vytvara  AST strom a podobne  </a:t>
             </a:r>
           </a:p>
           <a:p>
@@ -13364,7 +13294,7 @@
             <a:blip r:embed="rId3" cstate="print">
               <a:extLst>
                 <a:ext uri="{28A0092B-C50C-407E-A947-70E740481C1C}">
-                  <a14:useLocalDpi xmlns:a14="http://schemas.microsoft.com/office/drawing/2010/main" xmlns="" val="0"/>
+                  <a14:useLocalDpi xmlns="" xmlns:a14="http://schemas.microsoft.com/office/drawing/2010/main" val="0"/>
                 </a:ext>
               </a:extLst>
             </a:blip>
@@ -13388,14 +13318,14 @@
             <a:effectLst/>
             <a:extLst>
               <a:ext uri="{909E8E84-426E-40DD-AFC4-6F175D3DCCD1}">
-                <a14:hiddenFill xmlns:a14="http://schemas.microsoft.com/office/drawing/2010/main" xmlns="">
+                <a14:hiddenFill xmlns="" xmlns:a14="http://schemas.microsoft.com/office/drawing/2010/main">
                   <a:solidFill>
                     <a:schemeClr val="accent1"/>
                   </a:solidFill>
                 </a14:hiddenFill>
               </a:ext>
               <a:ext uri="{91240B29-F687-4F45-9708-019B960494DF}">
-                <a14:hiddenLine xmlns:a14="http://schemas.microsoft.com/office/drawing/2010/main" xmlns="" w="9525">
+                <a14:hiddenLine xmlns="" xmlns:a14="http://schemas.microsoft.com/office/drawing/2010/main" w="9525">
                   <a:solidFill>
                     <a:schemeClr val="tx1"/>
                   </a:solidFill>
@@ -13405,7 +13335,7 @@
                 </a14:hiddenLine>
               </a:ext>
               <a:ext uri="{AF507438-7753-43E0-B8FC-AC1667EBCBE1}">
-                <a14:hiddenEffects xmlns:a14="http://schemas.microsoft.com/office/drawing/2010/main" xmlns="">
+                <a14:hiddenEffects xmlns="" xmlns:a14="http://schemas.microsoft.com/office/drawing/2010/main">
                   <a:effectLst>
                     <a:outerShdw dist="35921" dir="2700000" algn="ctr" rotWithShape="0">
                       <a:schemeClr val="bg2"/>
@@ -13681,22 +13611,6 @@
               </a:rPr>
               <a:t>emo</a:t>
             </a:r>
-            <a:endParaRPr kumimoji="0" lang="en-US" sz="13200" u="none" strike="noStrike" kern="0" cap="none" spc="-300" normalizeH="0" baseline="0" noProof="0" dirty="0" smtClean="0">
-              <a:ln w="18415" cmpd="sng">
-                <a:noFill/>
-                <a:prstDash val="solid"/>
-              </a:ln>
-              <a:effectLst>
-                <a:outerShdw blurRad="38100" dist="38100" dir="2700000" algn="tl">
-                  <a:srgbClr val="000000">
-                    <a:alpha val="43137"/>
-                  </a:srgbClr>
-                </a:outerShdw>
-              </a:effectLst>
-              <a:uLnTx/>
-              <a:uFillTx/>
-              <a:latin typeface="Constantia" pitchFamily="18" charset="0"/>
-            </a:endParaRPr>
           </a:p>
         </p:txBody>
       </p:sp>
@@ -13990,14 +13904,7 @@
                 <a:latin typeface="Arial" pitchFamily="34" charset="0"/>
                 <a:cs typeface="Arial" pitchFamily="34" charset="0"/>
               </a:rPr>
-              <a:t>  </a:t>
-            </a:r>
-            <a:r>
-              <a:rPr lang="sk-SK" sz="1600" smtClean="0">
-                <a:latin typeface="Arial" pitchFamily="34" charset="0"/>
-                <a:cs typeface="Arial" pitchFamily="34" charset="0"/>
-              </a:rPr>
-              <a:t>Optimalizovať </a:t>
+              <a:t>  Optimalizovať </a:t>
             </a:r>
             <a:r>
               <a:rPr lang="sk-SK" sz="1600" dirty="0" smtClean="0">
@@ -14073,49 +13980,7 @@
                 <a:latin typeface="Arial" pitchFamily="34" charset="0"/>
                 <a:cs typeface="Arial" pitchFamily="34" charset="0"/>
               </a:rPr>
-              <a:t>  Rozšíriť </a:t>
-            </a:r>
-            <a:r>
-              <a:rPr lang="sk-SK" sz="1600" dirty="0" smtClean="0">
-                <a:latin typeface="Arial" pitchFamily="34" charset="0"/>
-                <a:cs typeface="Arial" pitchFamily="34" charset="0"/>
-              </a:rPr>
-              <a:t>vstávajúcu </a:t>
-            </a:r>
-            <a:r>
-              <a:rPr lang="sk-SK" sz="1600" dirty="0" smtClean="0">
-                <a:latin typeface="Arial" pitchFamily="34" charset="0"/>
-                <a:cs typeface="Arial" pitchFamily="34" charset="0"/>
-              </a:rPr>
-              <a:t>funkcionalitu editora (Vyhľadávanie, </a:t>
-            </a:r>
-            <a:r>
-              <a:rPr lang="sk-SK" sz="1600" dirty="0" smtClean="0">
-                <a:latin typeface="Arial" pitchFamily="34" charset="0"/>
-                <a:cs typeface="Arial" pitchFamily="34" charset="0"/>
-              </a:rPr>
-              <a:t>IntelliSense</a:t>
-            </a:r>
-            <a:r>
-              <a:rPr lang="sk-SK" sz="1600" dirty="0" smtClean="0">
-                <a:latin typeface="Arial" pitchFamily="34" charset="0"/>
-                <a:cs typeface="Arial" pitchFamily="34" charset="0"/>
-              </a:rPr>
-              <a:t>, </a:t>
-            </a:r>
-            <a:r>
-              <a:rPr lang="sk-SK" sz="1600" dirty="0" smtClean="0">
-                <a:latin typeface="Arial" pitchFamily="34" charset="0"/>
-                <a:cs typeface="Arial" pitchFamily="34" charset="0"/>
-              </a:rPr>
-              <a:t>Plug-in</a:t>
-            </a:r>
-            <a:r>
-              <a:rPr lang="sk-SK" sz="1600" dirty="0" smtClean="0">
-                <a:latin typeface="Arial" pitchFamily="34" charset="0"/>
-                <a:cs typeface="Arial" pitchFamily="34" charset="0"/>
-              </a:rPr>
-              <a:t>, CVS a pod.)</a:t>
+              <a:t>  Rozšíriť vstávajúcu funkcionalitu editora (Vyhľadávanie, IntelliSense, Plug-in, CVS a pod.)</a:t>
             </a:r>
           </a:p>
           <a:p>
@@ -14525,21 +14390,7 @@
                 <a:latin typeface="Arial" pitchFamily="34" charset="0"/>
                 <a:cs typeface="Arial" pitchFamily="34" charset="0"/>
               </a:rPr>
-              <a:t>(dočasné, možno bude .</a:t>
-            </a:r>
-            <a:r>
-              <a:rPr lang="sk-SK" sz="1400" dirty="0" smtClean="0">
-                <a:latin typeface="Arial" pitchFamily="34" charset="0"/>
-                <a:cs typeface="Arial" pitchFamily="34" charset="0"/>
-              </a:rPr>
-              <a:t>org</a:t>
-            </a:r>
-            <a:r>
-              <a:rPr lang="sk-SK" sz="1400" dirty="0" smtClean="0">
-                <a:latin typeface="Arial" pitchFamily="34" charset="0"/>
-                <a:cs typeface="Arial" pitchFamily="34" charset="0"/>
-              </a:rPr>
-              <a:t>)</a:t>
+              <a:t>(dočasné, možno bude .org)</a:t>
             </a:r>
             <a:endParaRPr lang="sk-SK" dirty="0" smtClean="0">
               <a:latin typeface="Arial" pitchFamily="34" charset="0"/>

</xml_diff>